<commit_message>
Update workbooks and slides.
</commit_message>
<xml_diff>
--- a/Slides/Day5_Rule_Based_Models_II.pptx
+++ b/Slides/Day5_Rule_Based_Models_II.pptx
@@ -2,15 +2,19 @@
 <file path=ppt/presentation.xml><?xml version="1.0" encoding="utf-8"?>
 <p:presentation xmlns:a="http://schemas.openxmlformats.org/drawingml/2006/main" xmlns:r="http://schemas.openxmlformats.org/officeDocument/2006/relationships" xmlns:p="http://schemas.openxmlformats.org/presentationml/2006/main" saveSubsetFonts="1">
   <p:sldMasterIdLst>
-    <p:sldMasterId id="2147483648" r:id="rId1"/>
+    <p:sldMasterId id="2147483660" r:id="rId1"/>
   </p:sldMasterIdLst>
   <p:notesMasterIdLst>
-    <p:notesMasterId r:id="rId5"/>
+    <p:notesMasterId r:id="rId9"/>
   </p:notesMasterIdLst>
   <p:sldIdLst>
     <p:sldId id="268" r:id="rId2"/>
-    <p:sldId id="269" r:id="rId3"/>
-    <p:sldId id="270" r:id="rId4"/>
+    <p:sldId id="271" r:id="rId3"/>
+    <p:sldId id="273" r:id="rId4"/>
+    <p:sldId id="272" r:id="rId5"/>
+    <p:sldId id="269" r:id="rId6"/>
+    <p:sldId id="270" r:id="rId7"/>
+    <p:sldId id="274" r:id="rId8"/>
   </p:sldIdLst>
   <p:sldSz cx="12192000" cy="6858000"/>
   <p:notesSz cx="6858000" cy="9144000"/>
@@ -18,7 +22,7 @@
     <a:defPPr>
       <a:defRPr lang="en-US"/>
     </a:defPPr>
-    <a:lvl1pPr marL="0" algn="l" defTabSz="914400" rtl="0" eaLnBrk="1" latinLnBrk="0" hangingPunct="1">
+    <a:lvl1pPr marL="0" algn="l" defTabSz="457200" rtl="0" eaLnBrk="1" latinLnBrk="0" hangingPunct="1">
       <a:defRPr sz="1800" kern="1200">
         <a:solidFill>
           <a:schemeClr val="tx1"/>
@@ -28,7 +32,7 @@
         <a:cs typeface="+mn-cs"/>
       </a:defRPr>
     </a:lvl1pPr>
-    <a:lvl2pPr marL="457200" algn="l" defTabSz="914400" rtl="0" eaLnBrk="1" latinLnBrk="0" hangingPunct="1">
+    <a:lvl2pPr marL="457200" algn="l" defTabSz="457200" rtl="0" eaLnBrk="1" latinLnBrk="0" hangingPunct="1">
       <a:defRPr sz="1800" kern="1200">
         <a:solidFill>
           <a:schemeClr val="tx1"/>
@@ -38,7 +42,7 @@
         <a:cs typeface="+mn-cs"/>
       </a:defRPr>
     </a:lvl2pPr>
-    <a:lvl3pPr marL="914400" algn="l" defTabSz="914400" rtl="0" eaLnBrk="1" latinLnBrk="0" hangingPunct="1">
+    <a:lvl3pPr marL="914400" algn="l" defTabSz="457200" rtl="0" eaLnBrk="1" latinLnBrk="0" hangingPunct="1">
       <a:defRPr sz="1800" kern="1200">
         <a:solidFill>
           <a:schemeClr val="tx1"/>
@@ -48,7 +52,7 @@
         <a:cs typeface="+mn-cs"/>
       </a:defRPr>
     </a:lvl3pPr>
-    <a:lvl4pPr marL="1371600" algn="l" defTabSz="914400" rtl="0" eaLnBrk="1" latinLnBrk="0" hangingPunct="1">
+    <a:lvl4pPr marL="1371600" algn="l" defTabSz="457200" rtl="0" eaLnBrk="1" latinLnBrk="0" hangingPunct="1">
       <a:defRPr sz="1800" kern="1200">
         <a:solidFill>
           <a:schemeClr val="tx1"/>
@@ -58,7 +62,7 @@
         <a:cs typeface="+mn-cs"/>
       </a:defRPr>
     </a:lvl4pPr>
-    <a:lvl5pPr marL="1828800" algn="l" defTabSz="914400" rtl="0" eaLnBrk="1" latinLnBrk="0" hangingPunct="1">
+    <a:lvl5pPr marL="1828800" algn="l" defTabSz="457200" rtl="0" eaLnBrk="1" latinLnBrk="0" hangingPunct="1">
       <a:defRPr sz="1800" kern="1200">
         <a:solidFill>
           <a:schemeClr val="tx1"/>
@@ -68,7 +72,7 @@
         <a:cs typeface="+mn-cs"/>
       </a:defRPr>
     </a:lvl5pPr>
-    <a:lvl6pPr marL="2286000" algn="l" defTabSz="914400" rtl="0" eaLnBrk="1" latinLnBrk="0" hangingPunct="1">
+    <a:lvl6pPr marL="2286000" algn="l" defTabSz="457200" rtl="0" eaLnBrk="1" latinLnBrk="0" hangingPunct="1">
       <a:defRPr sz="1800" kern="1200">
         <a:solidFill>
           <a:schemeClr val="tx1"/>
@@ -78,7 +82,7 @@
         <a:cs typeface="+mn-cs"/>
       </a:defRPr>
     </a:lvl6pPr>
-    <a:lvl7pPr marL="2743200" algn="l" defTabSz="914400" rtl="0" eaLnBrk="1" latinLnBrk="0" hangingPunct="1">
+    <a:lvl7pPr marL="2743200" algn="l" defTabSz="457200" rtl="0" eaLnBrk="1" latinLnBrk="0" hangingPunct="1">
       <a:defRPr sz="1800" kern="1200">
         <a:solidFill>
           <a:schemeClr val="tx1"/>
@@ -88,7 +92,7 @@
         <a:cs typeface="+mn-cs"/>
       </a:defRPr>
     </a:lvl7pPr>
-    <a:lvl8pPr marL="3200400" algn="l" defTabSz="914400" rtl="0" eaLnBrk="1" latinLnBrk="0" hangingPunct="1">
+    <a:lvl8pPr marL="3200400" algn="l" defTabSz="457200" rtl="0" eaLnBrk="1" latinLnBrk="0" hangingPunct="1">
       <a:defRPr sz="1800" kern="1200">
         <a:solidFill>
           <a:schemeClr val="tx1"/>
@@ -98,7 +102,7 @@
         <a:cs typeface="+mn-cs"/>
       </a:defRPr>
     </a:lvl8pPr>
-    <a:lvl9pPr marL="3657600" algn="l" defTabSz="914400" rtl="0" eaLnBrk="1" latinLnBrk="0" hangingPunct="1">
+    <a:lvl9pPr marL="3657600" algn="l" defTabSz="457200" rtl="0" eaLnBrk="1" latinLnBrk="0" hangingPunct="1">
       <a:defRPr sz="1800" kern="1200">
         <a:solidFill>
           <a:schemeClr val="tx1"/>
@@ -109,6 +113,11 @@
       </a:defRPr>
     </a:lvl9pPr>
   </p:defaultTextStyle>
+  <p:extLst>
+    <p:ext uri="{EFAFB233-063F-42B5-8137-9DF3F51BA10A}">
+      <p15:sldGuideLst xmlns:p15="http://schemas.microsoft.com/office/powerpoint/2012/main"/>
+    </p:ext>
+  </p:extLst>
 </p:presentation>
 </file>
 
@@ -194,7 +203,7 @@
           <a:p>
             <a:fld id="{89E38409-2940-447D-B7EE-C4C1A8D7999F}" type="datetimeFigureOut">
               <a:rPr lang="en-US" smtClean="0"/>
-              <a:t>7/25/2018</a:t>
+              <a:t>7/26/2018</a:t>
             </a:fld>
             <a:endParaRPr lang="en-US"/>
           </a:p>
@@ -529,7 +538,7 @@
           <a:p>
             <a:fld id="{B02857E3-973A-4372-AA25-35C1B3562A52}" type="slidenum">
               <a:rPr lang="en-US" smtClean="0"/>
-              <a:t>2</a:t>
+              <a:t>5</a:t>
             </a:fld>
             <a:endParaRPr lang="en-US"/>
           </a:p>
@@ -616,7 +625,7 @@
           <a:p>
             <a:fld id="{B02857E3-973A-4372-AA25-35C1B3562A52}" type="slidenum">
               <a:rPr lang="en-US" smtClean="0"/>
-              <a:t>3</a:t>
+              <a:t>6</a:t>
             </a:fld>
             <a:endParaRPr lang="en-US"/>
           </a:p>
@@ -638,6 +647,14 @@
 <file path=ppt/slideLayouts/slideLayout1.xml><?xml version="1.0" encoding="utf-8"?>
 <p:sldLayout xmlns:a="http://schemas.openxmlformats.org/drawingml/2006/main" xmlns:r="http://schemas.openxmlformats.org/officeDocument/2006/relationships" xmlns:p="http://schemas.openxmlformats.org/presentationml/2006/main" type="title" preserve="1">
   <p:cSld name="Title Slide">
+    <p:bg>
+      <p:bgPr>
+        <a:solidFill>
+          <a:schemeClr val="accent1"/>
+        </a:solidFill>
+        <a:effectLst/>
+      </p:bgPr>
+    </p:bg>
     <p:spTree>
       <p:nvGrpSpPr>
         <p:cNvPr id="1" name=""/>
@@ -654,31 +671,69 @@
       </p:grpSpPr>
       <p:sp>
         <p:nvSpPr>
-          <p:cNvPr id="2" name="Title 1">
-            <a:extLst>
-              <a:ext uri="{FF2B5EF4-FFF2-40B4-BE49-F238E27FC236}">
-                <a16:creationId xmlns:a16="http://schemas.microsoft.com/office/drawing/2014/main" id="{5CAAAAE1-AB1A-4482-87C6-7A5D8945F28B}"/>
-              </a:ext>
-            </a:extLst>
-          </p:cNvPr>
-          <p:cNvSpPr>
-            <a:spLocks noGrp="1"/>
-          </p:cNvSpPr>
-          <p:nvPr>
-            <p:ph type="ctrTitle"/>
-          </p:nvPr>
+          <p:cNvPr id="4" name="Rectangle 3"/>
+          <p:cNvSpPr/>
+          <p:nvPr/>
         </p:nvSpPr>
         <p:spPr>
           <a:xfrm>
-            <a:off x="1524000" y="1122363"/>
-            <a:ext cx="9144000" cy="2387600"/>
+            <a:off x="0" y="0"/>
+            <a:ext cx="12192000" cy="6858000"/>
+          </a:xfrm>
+          <a:prstGeom prst="rect">
+            <a:avLst/>
+          </a:prstGeom>
+          <a:ln>
+            <a:noFill/>
+          </a:ln>
+        </p:spPr>
+        <p:style>
+          <a:lnRef idx="2">
+            <a:schemeClr val="accent1">
+              <a:shade val="50000"/>
+            </a:schemeClr>
+          </a:lnRef>
+          <a:fillRef idx="1">
+            <a:schemeClr val="accent1"/>
+          </a:fillRef>
+          <a:effectRef idx="0">
+            <a:schemeClr val="accent1"/>
+          </a:effectRef>
+          <a:fontRef idx="minor">
+            <a:schemeClr val="lt1"/>
+          </a:fontRef>
+        </p:style>
+      </p:sp>
+      <p:sp>
+        <p:nvSpPr>
+          <p:cNvPr id="2" name="Title 1"/>
+          <p:cNvSpPr>
+            <a:spLocks noGrp="1"/>
+          </p:cNvSpPr>
+          <p:nvPr>
+            <p:ph type="ctrTitle"/>
+          </p:nvPr>
+        </p:nvSpPr>
+        <p:spPr>
+          <a:xfrm>
+            <a:off x="603504" y="770467"/>
+            <a:ext cx="10782300" cy="3352800"/>
           </a:xfrm>
         </p:spPr>
         <p:txBody>
-          <a:bodyPr anchor="b"/>
+          <a:bodyPr anchor="b">
+            <a:noAutofit/>
+          </a:bodyPr>
           <a:lstStyle>
-            <a:lvl1pPr algn="ctr">
-              <a:defRPr sz="6000"/>
+            <a:lvl1pPr algn="l">
+              <a:lnSpc>
+                <a:spcPct val="80000"/>
+              </a:lnSpc>
+              <a:defRPr sz="8800" spc="-120" baseline="0">
+                <a:solidFill>
+                  <a:srgbClr val="FFFFFF"/>
+                </a:solidFill>
+              </a:defRPr>
             </a:lvl1pPr>
           </a:lstStyle>
           <a:p>
@@ -686,18 +741,13 @@
               <a:rPr lang="en-US"/>
               <a:t>Click to edit Master title style</a:t>
             </a:r>
-          </a:p>
-        </p:txBody>
-      </p:sp>
-      <p:sp>
-        <p:nvSpPr>
-          <p:cNvPr id="3" name="Subtitle 2">
-            <a:extLst>
-              <a:ext uri="{FF2B5EF4-FFF2-40B4-BE49-F238E27FC236}">
-                <a16:creationId xmlns:a16="http://schemas.microsoft.com/office/drawing/2014/main" id="{1AC71ED6-E401-430E-A8F0-8562882E97E2}"/>
-              </a:ext>
-            </a:extLst>
-          </p:cNvPr>
+            <a:endParaRPr lang="en-US" dirty="0"/>
+          </a:p>
+        </p:txBody>
+      </p:sp>
+      <p:sp>
+        <p:nvSpPr>
+          <p:cNvPr id="3" name="Subtitle 2"/>
           <p:cNvSpPr>
             <a:spLocks noGrp="1"/>
           </p:cNvSpPr>
@@ -707,48 +757,55 @@
         </p:nvSpPr>
         <p:spPr>
           <a:xfrm>
-            <a:off x="1524000" y="3602038"/>
-            <a:ext cx="9144000" cy="1655762"/>
+            <a:off x="667512" y="4206876"/>
+            <a:ext cx="9228201" cy="1645920"/>
           </a:xfrm>
         </p:spPr>
         <p:txBody>
-          <a:bodyPr/>
+          <a:bodyPr>
+            <a:normAutofit/>
+          </a:bodyPr>
           <a:lstStyle>
-            <a:lvl1pPr marL="0" indent="0" algn="ctr">
-              <a:buNone/>
-              <a:defRPr sz="2400"/>
+            <a:lvl1pPr marL="0" indent="0" algn="l">
+              <a:buNone/>
+              <a:defRPr sz="3200">
+                <a:solidFill>
+                  <a:schemeClr val="bg1"/>
+                </a:solidFill>
+                <a:latin typeface="+mj-lt"/>
+              </a:defRPr>
             </a:lvl1pPr>
             <a:lvl2pPr marL="457200" indent="0" algn="ctr">
               <a:buNone/>
-              <a:defRPr sz="2000"/>
+              <a:defRPr sz="2800"/>
             </a:lvl2pPr>
             <a:lvl3pPr marL="914400" indent="0" algn="ctr">
               <a:buNone/>
-              <a:defRPr sz="1800"/>
+              <a:defRPr sz="2400"/>
             </a:lvl3pPr>
             <a:lvl4pPr marL="1371600" indent="0" algn="ctr">
               <a:buNone/>
-              <a:defRPr sz="1600"/>
+              <a:defRPr sz="2000"/>
             </a:lvl4pPr>
             <a:lvl5pPr marL="1828800" indent="0" algn="ctr">
               <a:buNone/>
-              <a:defRPr sz="1600"/>
+              <a:defRPr sz="2000"/>
             </a:lvl5pPr>
             <a:lvl6pPr marL="2286000" indent="0" algn="ctr">
               <a:buNone/>
-              <a:defRPr sz="1600"/>
+              <a:defRPr sz="2000"/>
             </a:lvl6pPr>
             <a:lvl7pPr marL="2743200" indent="0" algn="ctr">
               <a:buNone/>
-              <a:defRPr sz="1600"/>
+              <a:defRPr sz="2000"/>
             </a:lvl7pPr>
             <a:lvl8pPr marL="3200400" indent="0" algn="ctr">
               <a:buNone/>
-              <a:defRPr sz="1600"/>
+              <a:defRPr sz="2000"/>
             </a:lvl8pPr>
             <a:lvl9pPr marL="3657600" indent="0" algn="ctr">
               <a:buNone/>
-              <a:defRPr sz="1600"/>
+              <a:defRPr sz="2000"/>
             </a:lvl9pPr>
           </a:lstStyle>
           <a:p>
@@ -756,18 +813,13 @@
               <a:rPr lang="en-US"/>
               <a:t>Click to edit Master subtitle style</a:t>
             </a:r>
-          </a:p>
-        </p:txBody>
-      </p:sp>
-      <p:sp>
-        <p:nvSpPr>
-          <p:cNvPr id="4" name="Date Placeholder 3">
-            <a:extLst>
-              <a:ext uri="{FF2B5EF4-FFF2-40B4-BE49-F238E27FC236}">
-                <a16:creationId xmlns:a16="http://schemas.microsoft.com/office/drawing/2014/main" id="{83148921-7244-41DF-ADCC-51E38EDA6D02}"/>
-              </a:ext>
-            </a:extLst>
-          </p:cNvPr>
+            <a:endParaRPr lang="en-US" dirty="0"/>
+          </a:p>
+        </p:txBody>
+      </p:sp>
+      <p:sp>
+        <p:nvSpPr>
+          <p:cNvPr id="7" name="Date Placeholder 6"/>
           <p:cNvSpPr>
             <a:spLocks noGrp="1"/>
           </p:cNvSpPr>
@@ -778,11 +830,21 @@
         <p:spPr/>
         <p:txBody>
           <a:bodyPr/>
-          <a:lstStyle/>
+          <a:lstStyle>
+            <a:lvl1pPr>
+              <a:defRPr>
+                <a:solidFill>
+                  <a:srgbClr val="FFFFFF">
+                    <a:alpha val="80000"/>
+                  </a:srgbClr>
+                </a:solidFill>
+              </a:defRPr>
+            </a:lvl1pPr>
+          </a:lstStyle>
           <a:p>
             <a:fld id="{A0AC53BF-8DB1-47AF-97BC-90D36A1106E6}" type="datetimeFigureOut">
               <a:rPr lang="en-US" smtClean="0"/>
-              <a:t>7/25/2018</a:t>
+              <a:t>7/26/2018</a:t>
             </a:fld>
             <a:endParaRPr lang="en-US"/>
           </a:p>
@@ -790,13 +852,7 @@
       </p:sp>
       <p:sp>
         <p:nvSpPr>
-          <p:cNvPr id="5" name="Footer Placeholder 4">
-            <a:extLst>
-              <a:ext uri="{FF2B5EF4-FFF2-40B4-BE49-F238E27FC236}">
-                <a16:creationId xmlns:a16="http://schemas.microsoft.com/office/drawing/2014/main" id="{5173E783-7E27-481B-BCD8-6B211CA04462}"/>
-              </a:ext>
-            </a:extLst>
-          </p:cNvPr>
+          <p:cNvPr id="8" name="Footer Placeholder 7"/>
           <p:cNvSpPr>
             <a:spLocks noGrp="1"/>
           </p:cNvSpPr>
@@ -807,7 +863,17 @@
         <p:spPr/>
         <p:txBody>
           <a:bodyPr/>
-          <a:lstStyle/>
+          <a:lstStyle>
+            <a:lvl1pPr>
+              <a:defRPr>
+                <a:solidFill>
+                  <a:srgbClr val="FFFFFF">
+                    <a:alpha val="80000"/>
+                  </a:srgbClr>
+                </a:solidFill>
+              </a:defRPr>
+            </a:lvl1pPr>
+          </a:lstStyle>
           <a:p>
             <a:endParaRPr lang="en-US"/>
           </a:p>
@@ -815,13 +881,7 @@
       </p:sp>
       <p:sp>
         <p:nvSpPr>
-          <p:cNvPr id="6" name="Slide Number Placeholder 5">
-            <a:extLst>
-              <a:ext uri="{FF2B5EF4-FFF2-40B4-BE49-F238E27FC236}">
-                <a16:creationId xmlns:a16="http://schemas.microsoft.com/office/drawing/2014/main" id="{A37F18F5-0D89-4192-85EE-9C546A0239C7}"/>
-              </a:ext>
-            </a:extLst>
-          </p:cNvPr>
+          <p:cNvPr id="9" name="Slide Number Placeholder 8"/>
           <p:cNvSpPr>
             <a:spLocks noGrp="1"/>
           </p:cNvSpPr>
@@ -832,7 +892,17 @@
         <p:spPr/>
         <p:txBody>
           <a:bodyPr/>
-          <a:lstStyle/>
+          <a:lstStyle>
+            <a:lvl1pPr>
+              <a:defRPr>
+                <a:solidFill>
+                  <a:srgbClr val="FFFFFF">
+                    <a:alpha val="25000"/>
+                  </a:srgbClr>
+                </a:solidFill>
+              </a:defRPr>
+            </a:lvl1pPr>
+          </a:lstStyle>
           <a:p>
             <a:fld id="{15511D67-0B82-4F97-9792-D4DFE857E145}" type="slidenum">
               <a:rPr lang="en-US" smtClean="0"/>
@@ -845,7 +915,7 @@
     </p:spTree>
     <p:extLst>
       <p:ext uri="{BB962C8B-B14F-4D97-AF65-F5344CB8AC3E}">
-        <p14:creationId xmlns:p14="http://schemas.microsoft.com/office/powerpoint/2010/main" val="2302843467"/>
+        <p14:creationId xmlns:p14="http://schemas.microsoft.com/office/powerpoint/2010/main" val="1142343244"/>
       </p:ext>
     </p:extLst>
   </p:cSld>
@@ -874,13 +944,7 @@
       </p:grpSpPr>
       <p:sp>
         <p:nvSpPr>
-          <p:cNvPr id="2" name="Title 1">
-            <a:extLst>
-              <a:ext uri="{FF2B5EF4-FFF2-40B4-BE49-F238E27FC236}">
-                <a16:creationId xmlns:a16="http://schemas.microsoft.com/office/drawing/2014/main" id="{ED633F5F-A1DA-460F-8E64-B159A067C843}"/>
-              </a:ext>
-            </a:extLst>
-          </p:cNvPr>
+          <p:cNvPr id="2" name="Title 1"/>
           <p:cNvSpPr>
             <a:spLocks noGrp="1"/>
           </p:cNvSpPr>
@@ -897,18 +961,13 @@
               <a:rPr lang="en-US"/>
               <a:t>Click to edit Master title style</a:t>
             </a:r>
-          </a:p>
-        </p:txBody>
-      </p:sp>
-      <p:sp>
-        <p:nvSpPr>
-          <p:cNvPr id="3" name="Vertical Text Placeholder 2">
-            <a:extLst>
-              <a:ext uri="{FF2B5EF4-FFF2-40B4-BE49-F238E27FC236}">
-                <a16:creationId xmlns:a16="http://schemas.microsoft.com/office/drawing/2014/main" id="{25F06345-5121-4413-AAF1-40972F89A881}"/>
-              </a:ext>
-            </a:extLst>
-          </p:cNvPr>
+            <a:endParaRPr lang="en-US" dirty="0"/>
+          </a:p>
+        </p:txBody>
+      </p:sp>
+      <p:sp>
+        <p:nvSpPr>
+          <p:cNvPr id="3" name="Vertical Text Placeholder 2"/>
           <p:cNvSpPr>
             <a:spLocks noGrp="1"/>
           </p:cNvSpPr>
@@ -954,18 +1013,13 @@
               <a:rPr lang="en-US"/>
               <a:t>Fifth level</a:t>
             </a:r>
-          </a:p>
-        </p:txBody>
-      </p:sp>
-      <p:sp>
-        <p:nvSpPr>
-          <p:cNvPr id="4" name="Date Placeholder 3">
-            <a:extLst>
-              <a:ext uri="{FF2B5EF4-FFF2-40B4-BE49-F238E27FC236}">
-                <a16:creationId xmlns:a16="http://schemas.microsoft.com/office/drawing/2014/main" id="{AC89106A-AFFD-4169-882F-6A4E767A3B9B}"/>
-              </a:ext>
-            </a:extLst>
-          </p:cNvPr>
+            <a:endParaRPr lang="en-US" dirty="0"/>
+          </a:p>
+        </p:txBody>
+      </p:sp>
+      <p:sp>
+        <p:nvSpPr>
+          <p:cNvPr id="4" name="Date Placeholder 3"/>
           <p:cNvSpPr>
             <a:spLocks noGrp="1"/>
           </p:cNvSpPr>
@@ -980,7 +1034,7 @@
           <a:p>
             <a:fld id="{A0AC53BF-8DB1-47AF-97BC-90D36A1106E6}" type="datetimeFigureOut">
               <a:rPr lang="en-US" smtClean="0"/>
-              <a:t>7/25/2018</a:t>
+              <a:t>7/26/2018</a:t>
             </a:fld>
             <a:endParaRPr lang="en-US"/>
           </a:p>
@@ -988,13 +1042,7 @@
       </p:sp>
       <p:sp>
         <p:nvSpPr>
-          <p:cNvPr id="5" name="Footer Placeholder 4">
-            <a:extLst>
-              <a:ext uri="{FF2B5EF4-FFF2-40B4-BE49-F238E27FC236}">
-                <a16:creationId xmlns:a16="http://schemas.microsoft.com/office/drawing/2014/main" id="{955682C7-D749-4C29-A8BA-77AE08D470FD}"/>
-              </a:ext>
-            </a:extLst>
-          </p:cNvPr>
+          <p:cNvPr id="5" name="Footer Placeholder 4"/>
           <p:cNvSpPr>
             <a:spLocks noGrp="1"/>
           </p:cNvSpPr>
@@ -1013,13 +1061,7 @@
       </p:sp>
       <p:sp>
         <p:nvSpPr>
-          <p:cNvPr id="6" name="Slide Number Placeholder 5">
-            <a:extLst>
-              <a:ext uri="{FF2B5EF4-FFF2-40B4-BE49-F238E27FC236}">
-                <a16:creationId xmlns:a16="http://schemas.microsoft.com/office/drawing/2014/main" id="{FED5E3C9-D9F8-4CAD-9342-637428C3DF21}"/>
-              </a:ext>
-            </a:extLst>
-          </p:cNvPr>
+          <p:cNvPr id="6" name="Slide Number Placeholder 5"/>
           <p:cNvSpPr>
             <a:spLocks noGrp="1"/>
           </p:cNvSpPr>
@@ -1043,7 +1085,7 @@
     </p:spTree>
     <p:extLst>
       <p:ext uri="{BB962C8B-B14F-4D97-AF65-F5344CB8AC3E}">
-        <p14:creationId xmlns:p14="http://schemas.microsoft.com/office/powerpoint/2010/main" val="4203734617"/>
+        <p14:creationId xmlns:p14="http://schemas.microsoft.com/office/powerpoint/2010/main" val="186210138"/>
       </p:ext>
     </p:extLst>
   </p:cSld>
@@ -1072,13 +1114,7 @@
       </p:grpSpPr>
       <p:sp>
         <p:nvSpPr>
-          <p:cNvPr id="2" name="Vertical Title 1">
-            <a:extLst>
-              <a:ext uri="{FF2B5EF4-FFF2-40B4-BE49-F238E27FC236}">
-                <a16:creationId xmlns:a16="http://schemas.microsoft.com/office/drawing/2014/main" id="{D2C0C9C4-3FC6-47FF-9CDE-9E08D9BDC388}"/>
-              </a:ext>
-            </a:extLst>
-          </p:cNvPr>
+          <p:cNvPr id="2" name="Vertical Title 1"/>
           <p:cNvSpPr>
             <a:spLocks noGrp="1"/>
           </p:cNvSpPr>
@@ -1088,8 +1124,8 @@
         </p:nvSpPr>
         <p:spPr>
           <a:xfrm>
-            <a:off x="8724900" y="365125"/>
-            <a:ext cx="2628900" cy="5811838"/>
+            <a:off x="8743950" y="695325"/>
+            <a:ext cx="2628900" cy="4800600"/>
           </a:xfrm>
         </p:spPr>
         <p:txBody>
@@ -1100,18 +1136,13 @@
               <a:rPr lang="en-US"/>
               <a:t>Click to edit Master title style</a:t>
             </a:r>
-          </a:p>
-        </p:txBody>
-      </p:sp>
-      <p:sp>
-        <p:nvSpPr>
-          <p:cNvPr id="3" name="Vertical Text Placeholder 2">
-            <a:extLst>
-              <a:ext uri="{FF2B5EF4-FFF2-40B4-BE49-F238E27FC236}">
-                <a16:creationId xmlns:a16="http://schemas.microsoft.com/office/drawing/2014/main" id="{C541ABAF-A754-4B01-A999-A3D372750A2E}"/>
-              </a:ext>
-            </a:extLst>
-          </p:cNvPr>
+            <a:endParaRPr lang="en-US" dirty="0"/>
+          </a:p>
+        </p:txBody>
+      </p:sp>
+      <p:sp>
+        <p:nvSpPr>
+          <p:cNvPr id="3" name="Vertical Text Placeholder 2"/>
           <p:cNvSpPr>
             <a:spLocks noGrp="1"/>
           </p:cNvSpPr>
@@ -1121,8 +1152,8 @@
         </p:nvSpPr>
         <p:spPr>
           <a:xfrm>
-            <a:off x="838200" y="365125"/>
-            <a:ext cx="7734300" cy="5811838"/>
+            <a:off x="771525" y="714375"/>
+            <a:ext cx="7734300" cy="5400675"/>
           </a:xfrm>
         </p:spPr>
         <p:txBody>
@@ -1162,18 +1193,13 @@
               <a:rPr lang="en-US"/>
               <a:t>Fifth level</a:t>
             </a:r>
-          </a:p>
-        </p:txBody>
-      </p:sp>
-      <p:sp>
-        <p:nvSpPr>
-          <p:cNvPr id="4" name="Date Placeholder 3">
-            <a:extLst>
-              <a:ext uri="{FF2B5EF4-FFF2-40B4-BE49-F238E27FC236}">
-                <a16:creationId xmlns:a16="http://schemas.microsoft.com/office/drawing/2014/main" id="{9DA309DF-9C95-4F1A-A88C-927C05FDF110}"/>
-              </a:ext>
-            </a:extLst>
-          </p:cNvPr>
+            <a:endParaRPr lang="en-US" dirty="0"/>
+          </a:p>
+        </p:txBody>
+      </p:sp>
+      <p:sp>
+        <p:nvSpPr>
+          <p:cNvPr id="4" name="Date Placeholder 3"/>
           <p:cNvSpPr>
             <a:spLocks noGrp="1"/>
           </p:cNvSpPr>
@@ -1188,7 +1214,7 @@
           <a:p>
             <a:fld id="{A0AC53BF-8DB1-47AF-97BC-90D36A1106E6}" type="datetimeFigureOut">
               <a:rPr lang="en-US" smtClean="0"/>
-              <a:t>7/25/2018</a:t>
+              <a:t>7/26/2018</a:t>
             </a:fld>
             <a:endParaRPr lang="en-US"/>
           </a:p>
@@ -1196,13 +1222,7 @@
       </p:sp>
       <p:sp>
         <p:nvSpPr>
-          <p:cNvPr id="5" name="Footer Placeholder 4">
-            <a:extLst>
-              <a:ext uri="{FF2B5EF4-FFF2-40B4-BE49-F238E27FC236}">
-                <a16:creationId xmlns:a16="http://schemas.microsoft.com/office/drawing/2014/main" id="{42652543-7E11-4921-ADD5-19DFD854B7A9}"/>
-              </a:ext>
-            </a:extLst>
-          </p:cNvPr>
+          <p:cNvPr id="5" name="Footer Placeholder 4"/>
           <p:cNvSpPr>
             <a:spLocks noGrp="1"/>
           </p:cNvSpPr>
@@ -1221,13 +1241,7 @@
       </p:sp>
       <p:sp>
         <p:nvSpPr>
-          <p:cNvPr id="6" name="Slide Number Placeholder 5">
-            <a:extLst>
-              <a:ext uri="{FF2B5EF4-FFF2-40B4-BE49-F238E27FC236}">
-                <a16:creationId xmlns:a16="http://schemas.microsoft.com/office/drawing/2014/main" id="{BE377260-FDBD-499F-BA8E-C561D9BFB11F}"/>
-              </a:ext>
-            </a:extLst>
-          </p:cNvPr>
+          <p:cNvPr id="6" name="Slide Number Placeholder 5"/>
           <p:cNvSpPr>
             <a:spLocks noGrp="1"/>
           </p:cNvSpPr>
@@ -1251,7 +1265,7 @@
     </p:spTree>
     <p:extLst>
       <p:ext uri="{BB962C8B-B14F-4D97-AF65-F5344CB8AC3E}">
-        <p14:creationId xmlns:p14="http://schemas.microsoft.com/office/powerpoint/2010/main" val="3632125689"/>
+        <p14:creationId xmlns:p14="http://schemas.microsoft.com/office/powerpoint/2010/main" val="463708765"/>
       </p:ext>
     </p:extLst>
   </p:cSld>
@@ -1280,13 +1294,7 @@
       </p:grpSpPr>
       <p:sp>
         <p:nvSpPr>
-          <p:cNvPr id="2" name="Title 1">
-            <a:extLst>
-              <a:ext uri="{FF2B5EF4-FFF2-40B4-BE49-F238E27FC236}">
-                <a16:creationId xmlns:a16="http://schemas.microsoft.com/office/drawing/2014/main" id="{413E1143-7EBC-4AE2-80E2-D814F0A0FC93}"/>
-              </a:ext>
-            </a:extLst>
-          </p:cNvPr>
+          <p:cNvPr id="2" name="Title 1"/>
           <p:cNvSpPr>
             <a:spLocks noGrp="1"/>
           </p:cNvSpPr>
@@ -1303,18 +1311,13 @@
               <a:rPr lang="en-US"/>
               <a:t>Click to edit Master title style</a:t>
             </a:r>
-          </a:p>
-        </p:txBody>
-      </p:sp>
-      <p:sp>
-        <p:nvSpPr>
-          <p:cNvPr id="3" name="Content Placeholder 2">
-            <a:extLst>
-              <a:ext uri="{FF2B5EF4-FFF2-40B4-BE49-F238E27FC236}">
-                <a16:creationId xmlns:a16="http://schemas.microsoft.com/office/drawing/2014/main" id="{7B859028-4299-4686-B11F-F9C1FBBD2994}"/>
-              </a:ext>
-            </a:extLst>
-          </p:cNvPr>
+            <a:endParaRPr lang="en-US" dirty="0"/>
+          </a:p>
+        </p:txBody>
+      </p:sp>
+      <p:sp>
+        <p:nvSpPr>
+          <p:cNvPr id="3" name="Content Placeholder 2"/>
           <p:cNvSpPr>
             <a:spLocks noGrp="1"/>
           </p:cNvSpPr>
@@ -1360,18 +1363,13 @@
               <a:rPr lang="en-US"/>
               <a:t>Fifth level</a:t>
             </a:r>
-          </a:p>
-        </p:txBody>
-      </p:sp>
-      <p:sp>
-        <p:nvSpPr>
-          <p:cNvPr id="4" name="Date Placeholder 3">
-            <a:extLst>
-              <a:ext uri="{FF2B5EF4-FFF2-40B4-BE49-F238E27FC236}">
-                <a16:creationId xmlns:a16="http://schemas.microsoft.com/office/drawing/2014/main" id="{7B37E164-68BA-4595-B09A-0D214D45728C}"/>
-              </a:ext>
-            </a:extLst>
-          </p:cNvPr>
+            <a:endParaRPr lang="en-US" dirty="0"/>
+          </a:p>
+        </p:txBody>
+      </p:sp>
+      <p:sp>
+        <p:nvSpPr>
+          <p:cNvPr id="4" name="Date Placeholder 3"/>
           <p:cNvSpPr>
             <a:spLocks noGrp="1"/>
           </p:cNvSpPr>
@@ -1386,7 +1384,7 @@
           <a:p>
             <a:fld id="{A0AC53BF-8DB1-47AF-97BC-90D36A1106E6}" type="datetimeFigureOut">
               <a:rPr lang="en-US" smtClean="0"/>
-              <a:t>7/25/2018</a:t>
+              <a:t>7/26/2018</a:t>
             </a:fld>
             <a:endParaRPr lang="en-US"/>
           </a:p>
@@ -1394,13 +1392,7 @@
       </p:sp>
       <p:sp>
         <p:nvSpPr>
-          <p:cNvPr id="5" name="Footer Placeholder 4">
-            <a:extLst>
-              <a:ext uri="{FF2B5EF4-FFF2-40B4-BE49-F238E27FC236}">
-                <a16:creationId xmlns:a16="http://schemas.microsoft.com/office/drawing/2014/main" id="{190268BE-10DC-49B1-A376-8499D994ED8B}"/>
-              </a:ext>
-            </a:extLst>
-          </p:cNvPr>
+          <p:cNvPr id="5" name="Footer Placeholder 4"/>
           <p:cNvSpPr>
             <a:spLocks noGrp="1"/>
           </p:cNvSpPr>
@@ -1419,13 +1411,7 @@
       </p:sp>
       <p:sp>
         <p:nvSpPr>
-          <p:cNvPr id="6" name="Slide Number Placeholder 5">
-            <a:extLst>
-              <a:ext uri="{FF2B5EF4-FFF2-40B4-BE49-F238E27FC236}">
-                <a16:creationId xmlns:a16="http://schemas.microsoft.com/office/drawing/2014/main" id="{FB5AE3B0-C45B-4C65-923A-66548BF82D5E}"/>
-              </a:ext>
-            </a:extLst>
-          </p:cNvPr>
+          <p:cNvPr id="6" name="Slide Number Placeholder 5"/>
           <p:cNvSpPr>
             <a:spLocks noGrp="1"/>
           </p:cNvSpPr>
@@ -1449,7 +1435,7 @@
     </p:spTree>
     <p:extLst>
       <p:ext uri="{BB962C8B-B14F-4D97-AF65-F5344CB8AC3E}">
-        <p14:creationId xmlns:p14="http://schemas.microsoft.com/office/powerpoint/2010/main" val="2835636664"/>
+        <p14:creationId xmlns:p14="http://schemas.microsoft.com/office/powerpoint/2010/main" val="2233068869"/>
       </p:ext>
     </p:extLst>
   </p:cSld>
@@ -1478,13 +1464,7 @@
       </p:grpSpPr>
       <p:sp>
         <p:nvSpPr>
-          <p:cNvPr id="2" name="Title 1">
-            <a:extLst>
-              <a:ext uri="{FF2B5EF4-FFF2-40B4-BE49-F238E27FC236}">
-                <a16:creationId xmlns:a16="http://schemas.microsoft.com/office/drawing/2014/main" id="{39D915B0-7167-40AC-B595-B0B193242B53}"/>
-              </a:ext>
-            </a:extLst>
-          </p:cNvPr>
+          <p:cNvPr id="2" name="Title 1"/>
           <p:cNvSpPr>
             <a:spLocks noGrp="1"/>
           </p:cNvSpPr>
@@ -1494,63 +1474,68 @@
         </p:nvSpPr>
         <p:spPr>
           <a:xfrm>
-            <a:off x="831850" y="1709738"/>
-            <a:ext cx="10515600" cy="2852737"/>
+            <a:off x="603504" y="767419"/>
+            <a:ext cx="10780776" cy="3355848"/>
           </a:xfrm>
         </p:spPr>
         <p:txBody>
-          <a:bodyPr anchor="b"/>
+          <a:bodyPr anchor="b">
+            <a:normAutofit/>
+          </a:bodyPr>
           <a:lstStyle>
             <a:lvl1pPr>
-              <a:defRPr sz="6000"/>
-            </a:lvl1pPr>
-          </a:lstStyle>
-          <a:p>
-            <a:r>
-              <a:rPr lang="en-US"/>
-              <a:t>Click to edit Master title style</a:t>
-            </a:r>
-          </a:p>
-        </p:txBody>
-      </p:sp>
-      <p:sp>
-        <p:nvSpPr>
-          <p:cNvPr id="3" name="Text Placeholder 2">
-            <a:extLst>
-              <a:ext uri="{FF2B5EF4-FFF2-40B4-BE49-F238E27FC236}">
-                <a16:creationId xmlns:a16="http://schemas.microsoft.com/office/drawing/2014/main" id="{38E37046-2DE2-45E7-9A6D-AD86707D4B8B}"/>
-              </a:ext>
-            </a:extLst>
-          </p:cNvPr>
-          <p:cNvSpPr>
-            <a:spLocks noGrp="1"/>
-          </p:cNvSpPr>
-          <p:nvPr>
-            <p:ph type="body" idx="1"/>
-          </p:nvPr>
-        </p:nvSpPr>
-        <p:spPr>
-          <a:xfrm>
-            <a:off x="831850" y="4589463"/>
-            <a:ext cx="10515600" cy="1500187"/>
-          </a:xfrm>
-        </p:spPr>
-        <p:txBody>
-          <a:bodyPr/>
-          <a:lstStyle>
-            <a:lvl1pPr marL="0" indent="0">
-              <a:buNone/>
-              <a:defRPr sz="2400">
+              <a:lnSpc>
+                <a:spcPct val="80000"/>
+              </a:lnSpc>
+              <a:defRPr sz="8800" b="0" baseline="0">
                 <a:solidFill>
-                  <a:schemeClr val="tx1">
-                    <a:tint val="75000"/>
-                  </a:schemeClr>
+                  <a:schemeClr val="accent1"/>
                 </a:solidFill>
               </a:defRPr>
             </a:lvl1pPr>
+          </a:lstStyle>
+          <a:p>
+            <a:r>
+              <a:rPr lang="en-US"/>
+              <a:t>Click to edit Master title style</a:t>
+            </a:r>
+            <a:endParaRPr lang="en-US" dirty="0"/>
+          </a:p>
+        </p:txBody>
+      </p:sp>
+      <p:sp>
+        <p:nvSpPr>
+          <p:cNvPr id="3" name="Text Placeholder 2"/>
+          <p:cNvSpPr>
+            <a:spLocks noGrp="1"/>
+          </p:cNvSpPr>
+          <p:nvPr>
+            <p:ph type="body" idx="1"/>
+          </p:nvPr>
+        </p:nvSpPr>
+        <p:spPr>
+          <a:xfrm>
+            <a:off x="667512" y="4204209"/>
+            <a:ext cx="9226296" cy="1645920"/>
+          </a:xfrm>
+        </p:spPr>
+        <p:txBody>
+          <a:bodyPr anchor="t">
+            <a:normAutofit/>
+          </a:bodyPr>
+          <a:lstStyle>
+            <a:lvl1pPr marL="0" indent="0">
+              <a:buNone/>
+              <a:defRPr sz="3200">
+                <a:solidFill>
+                  <a:schemeClr val="tx1"/>
+                </a:solidFill>
+                <a:latin typeface="+mj-lt"/>
+              </a:defRPr>
+            </a:lvl1pPr>
             <a:lvl2pPr marL="457200" indent="0">
               <a:buNone/>
-              <a:defRPr sz="2000">
+              <a:defRPr sz="1800">
                 <a:solidFill>
                   <a:schemeClr val="tx1">
                     <a:tint val="75000"/>
@@ -1560,7 +1545,7 @@
             </a:lvl2pPr>
             <a:lvl3pPr marL="914400" indent="0">
               <a:buNone/>
-              <a:defRPr sz="1800">
+              <a:defRPr sz="1600">
                 <a:solidFill>
                   <a:schemeClr val="tx1">
                     <a:tint val="75000"/>
@@ -1570,7 +1555,7 @@
             </a:lvl3pPr>
             <a:lvl4pPr marL="1371600" indent="0">
               <a:buNone/>
-              <a:defRPr sz="1600">
+              <a:defRPr sz="1400">
                 <a:solidFill>
                   <a:schemeClr val="tx1">
                     <a:tint val="75000"/>
@@ -1580,7 +1565,7 @@
             </a:lvl4pPr>
             <a:lvl5pPr marL="1828800" indent="0">
               <a:buNone/>
-              <a:defRPr sz="1600">
+              <a:defRPr sz="1400">
                 <a:solidFill>
                   <a:schemeClr val="tx1">
                     <a:tint val="75000"/>
@@ -1590,7 +1575,7 @@
             </a:lvl5pPr>
             <a:lvl6pPr marL="2286000" indent="0">
               <a:buNone/>
-              <a:defRPr sz="1600">
+              <a:defRPr sz="1400">
                 <a:solidFill>
                   <a:schemeClr val="tx1">
                     <a:tint val="75000"/>
@@ -1600,7 +1585,7 @@
             </a:lvl6pPr>
             <a:lvl7pPr marL="2743200" indent="0">
               <a:buNone/>
-              <a:defRPr sz="1600">
+              <a:defRPr sz="1400">
                 <a:solidFill>
                   <a:schemeClr val="tx1">
                     <a:tint val="75000"/>
@@ -1610,7 +1595,7 @@
             </a:lvl7pPr>
             <a:lvl8pPr marL="3200400" indent="0">
               <a:buNone/>
-              <a:defRPr sz="1600">
+              <a:defRPr sz="1400">
                 <a:solidFill>
                   <a:schemeClr val="tx1">
                     <a:tint val="75000"/>
@@ -1620,7 +1605,7 @@
             </a:lvl8pPr>
             <a:lvl9pPr marL="3657600" indent="0">
               <a:buNone/>
-              <a:defRPr sz="1600">
+              <a:defRPr sz="1400">
                 <a:solidFill>
                   <a:schemeClr val="tx1">
                     <a:tint val="75000"/>
@@ -1640,13 +1625,7 @@
       </p:sp>
       <p:sp>
         <p:nvSpPr>
-          <p:cNvPr id="4" name="Date Placeholder 3">
-            <a:extLst>
-              <a:ext uri="{FF2B5EF4-FFF2-40B4-BE49-F238E27FC236}">
-                <a16:creationId xmlns:a16="http://schemas.microsoft.com/office/drawing/2014/main" id="{CA2406D6-C0C6-4E2A-B2FD-21338EBD6810}"/>
-              </a:ext>
-            </a:extLst>
-          </p:cNvPr>
+          <p:cNvPr id="4" name="Date Placeholder 3"/>
           <p:cNvSpPr>
             <a:spLocks noGrp="1"/>
           </p:cNvSpPr>
@@ -1661,7 +1640,7 @@
           <a:p>
             <a:fld id="{A0AC53BF-8DB1-47AF-97BC-90D36A1106E6}" type="datetimeFigureOut">
               <a:rPr lang="en-US" smtClean="0"/>
-              <a:t>7/25/2018</a:t>
+              <a:t>7/26/2018</a:t>
             </a:fld>
             <a:endParaRPr lang="en-US"/>
           </a:p>
@@ -1669,13 +1648,7 @@
       </p:sp>
       <p:sp>
         <p:nvSpPr>
-          <p:cNvPr id="5" name="Footer Placeholder 4">
-            <a:extLst>
-              <a:ext uri="{FF2B5EF4-FFF2-40B4-BE49-F238E27FC236}">
-                <a16:creationId xmlns:a16="http://schemas.microsoft.com/office/drawing/2014/main" id="{F436DD50-F68A-4742-9503-31A89682FE12}"/>
-              </a:ext>
-            </a:extLst>
-          </p:cNvPr>
+          <p:cNvPr id="5" name="Footer Placeholder 4"/>
           <p:cNvSpPr>
             <a:spLocks noGrp="1"/>
           </p:cNvSpPr>
@@ -1694,13 +1667,7 @@
       </p:sp>
       <p:sp>
         <p:nvSpPr>
-          <p:cNvPr id="6" name="Slide Number Placeholder 5">
-            <a:extLst>
-              <a:ext uri="{FF2B5EF4-FFF2-40B4-BE49-F238E27FC236}">
-                <a16:creationId xmlns:a16="http://schemas.microsoft.com/office/drawing/2014/main" id="{ACA9A6D2-B834-4B19-B56E-6E29DB8A039A}"/>
-              </a:ext>
-            </a:extLst>
-          </p:cNvPr>
+          <p:cNvPr id="6" name="Slide Number Placeholder 5"/>
           <p:cNvSpPr>
             <a:spLocks noGrp="1"/>
           </p:cNvSpPr>
@@ -1724,7 +1691,7 @@
     </p:spTree>
     <p:extLst>
       <p:ext uri="{BB962C8B-B14F-4D97-AF65-F5344CB8AC3E}">
-        <p14:creationId xmlns:p14="http://schemas.microsoft.com/office/powerpoint/2010/main" val="1502015991"/>
+        <p14:creationId xmlns:p14="http://schemas.microsoft.com/office/powerpoint/2010/main" val="2278620242"/>
       </p:ext>
     </p:extLst>
   </p:cSld>
@@ -1753,13 +1720,7 @@
       </p:grpSpPr>
       <p:sp>
         <p:nvSpPr>
-          <p:cNvPr id="2" name="Title 1">
-            <a:extLst>
-              <a:ext uri="{FF2B5EF4-FFF2-40B4-BE49-F238E27FC236}">
-                <a16:creationId xmlns:a16="http://schemas.microsoft.com/office/drawing/2014/main" id="{C34A60B4-DFA9-40E6-BE01-78AE7B0551B1}"/>
-              </a:ext>
-            </a:extLst>
-          </p:cNvPr>
+          <p:cNvPr id="2" name="Title 1"/>
           <p:cNvSpPr>
             <a:spLocks noGrp="1"/>
           </p:cNvSpPr>
@@ -1776,18 +1737,13 @@
               <a:rPr lang="en-US"/>
               <a:t>Click to edit Master title style</a:t>
             </a:r>
-          </a:p>
-        </p:txBody>
-      </p:sp>
-      <p:sp>
-        <p:nvSpPr>
-          <p:cNvPr id="3" name="Content Placeholder 2">
-            <a:extLst>
-              <a:ext uri="{FF2B5EF4-FFF2-40B4-BE49-F238E27FC236}">
-                <a16:creationId xmlns:a16="http://schemas.microsoft.com/office/drawing/2014/main" id="{07C3C0CB-AAD5-4E70-987E-DB750F4D72AF}"/>
-              </a:ext>
-            </a:extLst>
-          </p:cNvPr>
+            <a:endParaRPr lang="en-US" dirty="0"/>
+          </a:p>
+        </p:txBody>
+      </p:sp>
+      <p:sp>
+        <p:nvSpPr>
+          <p:cNvPr id="3" name="Content Placeholder 2"/>
           <p:cNvSpPr>
             <a:spLocks noGrp="1"/>
           </p:cNvSpPr>
@@ -1797,13 +1753,41 @@
         </p:nvSpPr>
         <p:spPr>
           <a:xfrm>
-            <a:off x="838200" y="1825625"/>
-            <a:ext cx="5181600" cy="4351338"/>
+            <a:off x="676656" y="1998134"/>
+            <a:ext cx="4663440" cy="3767328"/>
           </a:xfrm>
         </p:spPr>
         <p:txBody>
           <a:bodyPr/>
-          <a:lstStyle/>
+          <a:lstStyle>
+            <a:lvl1pPr>
+              <a:defRPr sz="2400"/>
+            </a:lvl1pPr>
+            <a:lvl2pPr>
+              <a:defRPr sz="2000"/>
+            </a:lvl2pPr>
+            <a:lvl3pPr>
+              <a:defRPr sz="1800"/>
+            </a:lvl3pPr>
+            <a:lvl4pPr>
+              <a:defRPr sz="1600"/>
+            </a:lvl4pPr>
+            <a:lvl5pPr>
+              <a:defRPr sz="1600"/>
+            </a:lvl5pPr>
+            <a:lvl6pPr>
+              <a:defRPr sz="1600"/>
+            </a:lvl6pPr>
+            <a:lvl7pPr>
+              <a:defRPr sz="1600"/>
+            </a:lvl7pPr>
+            <a:lvl8pPr>
+              <a:defRPr sz="1600"/>
+            </a:lvl8pPr>
+            <a:lvl9pPr>
+              <a:defRPr sz="1600"/>
+            </a:lvl9pPr>
+          </a:lstStyle>
           <a:p>
             <a:pPr lvl="0"/>
             <a:r>
@@ -1838,18 +1822,13 @@
               <a:rPr lang="en-US"/>
               <a:t>Fifth level</a:t>
             </a:r>
-          </a:p>
-        </p:txBody>
-      </p:sp>
-      <p:sp>
-        <p:nvSpPr>
-          <p:cNvPr id="4" name="Content Placeholder 3">
-            <a:extLst>
-              <a:ext uri="{FF2B5EF4-FFF2-40B4-BE49-F238E27FC236}">
-                <a16:creationId xmlns:a16="http://schemas.microsoft.com/office/drawing/2014/main" id="{9853D80A-8AAA-4A73-8D3F-CF3C12E14FEA}"/>
-              </a:ext>
-            </a:extLst>
-          </p:cNvPr>
+            <a:endParaRPr lang="en-US" dirty="0"/>
+          </a:p>
+        </p:txBody>
+      </p:sp>
+      <p:sp>
+        <p:nvSpPr>
+          <p:cNvPr id="4" name="Content Placeholder 3"/>
           <p:cNvSpPr>
             <a:spLocks noGrp="1"/>
           </p:cNvSpPr>
@@ -1859,13 +1838,41 @@
         </p:nvSpPr>
         <p:spPr>
           <a:xfrm>
-            <a:off x="6172200" y="1825625"/>
-            <a:ext cx="5181600" cy="4351338"/>
+            <a:off x="6011330" y="1998134"/>
+            <a:ext cx="4663440" cy="3767328"/>
           </a:xfrm>
         </p:spPr>
         <p:txBody>
           <a:bodyPr/>
-          <a:lstStyle/>
+          <a:lstStyle>
+            <a:lvl1pPr>
+              <a:defRPr sz="2400"/>
+            </a:lvl1pPr>
+            <a:lvl2pPr>
+              <a:defRPr sz="2000"/>
+            </a:lvl2pPr>
+            <a:lvl3pPr>
+              <a:defRPr sz="1800"/>
+            </a:lvl3pPr>
+            <a:lvl4pPr>
+              <a:defRPr sz="1600"/>
+            </a:lvl4pPr>
+            <a:lvl5pPr>
+              <a:defRPr sz="1600"/>
+            </a:lvl5pPr>
+            <a:lvl6pPr>
+              <a:defRPr sz="1600"/>
+            </a:lvl6pPr>
+            <a:lvl7pPr>
+              <a:defRPr sz="1600"/>
+            </a:lvl7pPr>
+            <a:lvl8pPr>
+              <a:defRPr sz="1600"/>
+            </a:lvl8pPr>
+            <a:lvl9pPr>
+              <a:defRPr sz="1600"/>
+            </a:lvl9pPr>
+          </a:lstStyle>
           <a:p>
             <a:pPr lvl="0"/>
             <a:r>
@@ -1900,18 +1907,13 @@
               <a:rPr lang="en-US"/>
               <a:t>Fifth level</a:t>
             </a:r>
-          </a:p>
-        </p:txBody>
-      </p:sp>
-      <p:sp>
-        <p:nvSpPr>
-          <p:cNvPr id="5" name="Date Placeholder 4">
-            <a:extLst>
-              <a:ext uri="{FF2B5EF4-FFF2-40B4-BE49-F238E27FC236}">
-                <a16:creationId xmlns:a16="http://schemas.microsoft.com/office/drawing/2014/main" id="{0BD6F32C-56C0-4A95-9F68-21D78A621B96}"/>
-              </a:ext>
-            </a:extLst>
-          </p:cNvPr>
+            <a:endParaRPr lang="en-US" dirty="0"/>
+          </a:p>
+        </p:txBody>
+      </p:sp>
+      <p:sp>
+        <p:nvSpPr>
+          <p:cNvPr id="5" name="Date Placeholder 4"/>
           <p:cNvSpPr>
             <a:spLocks noGrp="1"/>
           </p:cNvSpPr>
@@ -1926,7 +1928,7 @@
           <a:p>
             <a:fld id="{A0AC53BF-8DB1-47AF-97BC-90D36A1106E6}" type="datetimeFigureOut">
               <a:rPr lang="en-US" smtClean="0"/>
-              <a:t>7/25/2018</a:t>
+              <a:t>7/26/2018</a:t>
             </a:fld>
             <a:endParaRPr lang="en-US"/>
           </a:p>
@@ -1934,13 +1936,7 @@
       </p:sp>
       <p:sp>
         <p:nvSpPr>
-          <p:cNvPr id="6" name="Footer Placeholder 5">
-            <a:extLst>
-              <a:ext uri="{FF2B5EF4-FFF2-40B4-BE49-F238E27FC236}">
-                <a16:creationId xmlns:a16="http://schemas.microsoft.com/office/drawing/2014/main" id="{AB0B6463-AD0D-4A90-9862-5EA14B5464B0}"/>
-              </a:ext>
-            </a:extLst>
-          </p:cNvPr>
+          <p:cNvPr id="6" name="Footer Placeholder 5"/>
           <p:cNvSpPr>
             <a:spLocks noGrp="1"/>
           </p:cNvSpPr>
@@ -1959,13 +1955,7 @@
       </p:sp>
       <p:sp>
         <p:nvSpPr>
-          <p:cNvPr id="7" name="Slide Number Placeholder 6">
-            <a:extLst>
-              <a:ext uri="{FF2B5EF4-FFF2-40B4-BE49-F238E27FC236}">
-                <a16:creationId xmlns:a16="http://schemas.microsoft.com/office/drawing/2014/main" id="{5898BBE5-569F-4761-A53B-9863E3341391}"/>
-              </a:ext>
-            </a:extLst>
-          </p:cNvPr>
+          <p:cNvPr id="7" name="Slide Number Placeholder 6"/>
           <p:cNvSpPr>
             <a:spLocks noGrp="1"/>
           </p:cNvSpPr>
@@ -1989,7 +1979,7 @@
     </p:spTree>
     <p:extLst>
       <p:ext uri="{BB962C8B-B14F-4D97-AF65-F5344CB8AC3E}">
-        <p14:creationId xmlns:p14="http://schemas.microsoft.com/office/powerpoint/2010/main" val="658819109"/>
+        <p14:creationId xmlns:p14="http://schemas.microsoft.com/office/powerpoint/2010/main" val="1236042347"/>
       </p:ext>
     </p:extLst>
   </p:cSld>
@@ -2018,65 +2008,59 @@
       </p:grpSpPr>
       <p:sp>
         <p:nvSpPr>
-          <p:cNvPr id="2" name="Title 1">
-            <a:extLst>
-              <a:ext uri="{FF2B5EF4-FFF2-40B4-BE49-F238E27FC236}">
-                <a16:creationId xmlns:a16="http://schemas.microsoft.com/office/drawing/2014/main" id="{9EF21E9F-C06C-475D-B040-6C8D031DDB73}"/>
-              </a:ext>
-            </a:extLst>
-          </p:cNvPr>
+          <p:cNvPr id="10" name="Title 9"/>
           <p:cNvSpPr>
             <a:spLocks noGrp="1"/>
           </p:cNvSpPr>
           <p:nvPr>
             <p:ph type="title"/>
+          </p:nvPr>
+        </p:nvSpPr>
+        <p:spPr/>
+        <p:txBody>
+          <a:bodyPr/>
+          <a:lstStyle/>
+          <a:p>
+            <a:r>
+              <a:rPr lang="en-US"/>
+              <a:t>Click to edit Master title style</a:t>
+            </a:r>
+            <a:endParaRPr lang="en-US" dirty="0"/>
+          </a:p>
+        </p:txBody>
+      </p:sp>
+      <p:sp>
+        <p:nvSpPr>
+          <p:cNvPr id="3" name="Text Placeholder 2"/>
+          <p:cNvSpPr>
+            <a:spLocks noGrp="1"/>
+          </p:cNvSpPr>
+          <p:nvPr>
+            <p:ph type="body" idx="1"/>
           </p:nvPr>
         </p:nvSpPr>
         <p:spPr>
           <a:xfrm>
-            <a:off x="839788" y="365125"/>
-            <a:ext cx="10515600" cy="1325563"/>
+            <a:off x="676656" y="2040467"/>
+            <a:ext cx="4663440" cy="723400"/>
           </a:xfrm>
         </p:spPr>
         <p:txBody>
-          <a:bodyPr/>
-          <a:lstStyle/>
-          <a:p>
-            <a:r>
-              <a:rPr lang="en-US"/>
-              <a:t>Click to edit Master title style</a:t>
-            </a:r>
-          </a:p>
-        </p:txBody>
-      </p:sp>
-      <p:sp>
-        <p:nvSpPr>
-          <p:cNvPr id="3" name="Text Placeholder 2">
-            <a:extLst>
-              <a:ext uri="{FF2B5EF4-FFF2-40B4-BE49-F238E27FC236}">
-                <a16:creationId xmlns:a16="http://schemas.microsoft.com/office/drawing/2014/main" id="{067A270C-1CBE-4BB2-87E9-DB720ECB1990}"/>
-              </a:ext>
-            </a:extLst>
-          </p:cNvPr>
-          <p:cNvSpPr>
-            <a:spLocks noGrp="1"/>
-          </p:cNvSpPr>
-          <p:nvPr>
-            <p:ph type="body" idx="1"/>
-          </p:nvPr>
-        </p:nvSpPr>
-        <p:spPr>
-          <a:xfrm>
-            <a:off x="839788" y="1681163"/>
-            <a:ext cx="5157787" cy="823912"/>
-          </a:xfrm>
-        </p:spPr>
-        <p:txBody>
-          <a:bodyPr anchor="b"/>
+          <a:bodyPr anchor="ctr">
+            <a:normAutofit/>
+          </a:bodyPr>
           <a:lstStyle>
             <a:lvl1pPr marL="0" indent="0">
               <a:buNone/>
-              <a:defRPr sz="2400" b="1"/>
+              <a:defRPr sz="2200" b="0" cap="all" baseline="0">
+                <a:solidFill>
+                  <a:schemeClr val="tx1">
+                    <a:lumMod val="85000"/>
+                    <a:lumOff val="15000"/>
+                  </a:schemeClr>
+                </a:solidFill>
+                <a:latin typeface="+mj-lt"/>
+              </a:defRPr>
             </a:lvl1pPr>
             <a:lvl2pPr marL="457200" indent="0">
               <a:buNone/>
@@ -2122,13 +2106,7 @@
       </p:sp>
       <p:sp>
         <p:nvSpPr>
-          <p:cNvPr id="4" name="Content Placeholder 3">
-            <a:extLst>
-              <a:ext uri="{FF2B5EF4-FFF2-40B4-BE49-F238E27FC236}">
-                <a16:creationId xmlns:a16="http://schemas.microsoft.com/office/drawing/2014/main" id="{B1E692C9-2C6F-4CCD-842B-D9ECA9500CE5}"/>
-              </a:ext>
-            </a:extLst>
-          </p:cNvPr>
+          <p:cNvPr id="4" name="Content Placeholder 3"/>
           <p:cNvSpPr>
             <a:spLocks noGrp="1"/>
           </p:cNvSpPr>
@@ -2138,13 +2116,41 @@
         </p:nvSpPr>
         <p:spPr>
           <a:xfrm>
-            <a:off x="839788" y="2505075"/>
-            <a:ext cx="5157787" cy="3684588"/>
+            <a:off x="676656" y="2753084"/>
+            <a:ext cx="4663440" cy="3200400"/>
           </a:xfrm>
         </p:spPr>
         <p:txBody>
           <a:bodyPr/>
-          <a:lstStyle/>
+          <a:lstStyle>
+            <a:lvl1pPr>
+              <a:defRPr sz="2400"/>
+            </a:lvl1pPr>
+            <a:lvl2pPr>
+              <a:defRPr sz="2000"/>
+            </a:lvl2pPr>
+            <a:lvl3pPr>
+              <a:defRPr sz="1800"/>
+            </a:lvl3pPr>
+            <a:lvl4pPr>
+              <a:defRPr sz="1600"/>
+            </a:lvl4pPr>
+            <a:lvl5pPr>
+              <a:defRPr sz="1600"/>
+            </a:lvl5pPr>
+            <a:lvl6pPr>
+              <a:defRPr sz="1600"/>
+            </a:lvl6pPr>
+            <a:lvl7pPr>
+              <a:defRPr sz="1600"/>
+            </a:lvl7pPr>
+            <a:lvl8pPr>
+              <a:defRPr sz="1600"/>
+            </a:lvl8pPr>
+            <a:lvl9pPr>
+              <a:defRPr sz="1600"/>
+            </a:lvl9pPr>
+          </a:lstStyle>
           <a:p>
             <a:pPr lvl="0"/>
             <a:r>
@@ -2179,18 +2185,13 @@
               <a:rPr lang="en-US"/>
               <a:t>Fifth level</a:t>
             </a:r>
-          </a:p>
-        </p:txBody>
-      </p:sp>
-      <p:sp>
-        <p:nvSpPr>
-          <p:cNvPr id="5" name="Text Placeholder 4">
-            <a:extLst>
-              <a:ext uri="{FF2B5EF4-FFF2-40B4-BE49-F238E27FC236}">
-                <a16:creationId xmlns:a16="http://schemas.microsoft.com/office/drawing/2014/main" id="{AEFF0BB1-A6FB-41C5-B43D-94680483C4E9}"/>
-              </a:ext>
-            </a:extLst>
-          </p:cNvPr>
+            <a:endParaRPr lang="en-US" dirty="0"/>
+          </a:p>
+        </p:txBody>
+      </p:sp>
+      <p:sp>
+        <p:nvSpPr>
+          <p:cNvPr id="5" name="Text Placeholder 4"/>
           <p:cNvSpPr>
             <a:spLocks noGrp="1"/>
           </p:cNvSpPr>
@@ -2200,16 +2201,26 @@
         </p:nvSpPr>
         <p:spPr>
           <a:xfrm>
-            <a:off x="6172200" y="1681163"/>
-            <a:ext cx="5183188" cy="823912"/>
+            <a:off x="6007608" y="2038435"/>
+            <a:ext cx="4663440" cy="722376"/>
           </a:xfrm>
         </p:spPr>
         <p:txBody>
-          <a:bodyPr anchor="b"/>
+          <a:bodyPr anchor="ctr">
+            <a:normAutofit/>
+          </a:bodyPr>
           <a:lstStyle>
             <a:lvl1pPr marL="0" indent="0">
               <a:buNone/>
-              <a:defRPr sz="2400" b="1"/>
+              <a:defRPr sz="2200" b="0" cap="all" baseline="0">
+                <a:solidFill>
+                  <a:schemeClr val="tx1">
+                    <a:lumMod val="85000"/>
+                    <a:lumOff val="15000"/>
+                  </a:schemeClr>
+                </a:solidFill>
+                <a:latin typeface="+mj-lt"/>
+              </a:defRPr>
             </a:lvl1pPr>
             <a:lvl2pPr marL="457200" indent="0">
               <a:buNone/>
@@ -2255,13 +2266,7 @@
       </p:sp>
       <p:sp>
         <p:nvSpPr>
-          <p:cNvPr id="6" name="Content Placeholder 5">
-            <a:extLst>
-              <a:ext uri="{FF2B5EF4-FFF2-40B4-BE49-F238E27FC236}">
-                <a16:creationId xmlns:a16="http://schemas.microsoft.com/office/drawing/2014/main" id="{17080124-9D1F-433F-BFE7-045C285784B5}"/>
-              </a:ext>
-            </a:extLst>
-          </p:cNvPr>
+          <p:cNvPr id="6" name="Content Placeholder 5"/>
           <p:cNvSpPr>
             <a:spLocks noGrp="1"/>
           </p:cNvSpPr>
@@ -2271,13 +2276,41 @@
         </p:nvSpPr>
         <p:spPr>
           <a:xfrm>
-            <a:off x="6172200" y="2505075"/>
-            <a:ext cx="5183188" cy="3684588"/>
+            <a:off x="6007608" y="2750990"/>
+            <a:ext cx="4663440" cy="3200400"/>
           </a:xfrm>
         </p:spPr>
         <p:txBody>
           <a:bodyPr/>
-          <a:lstStyle/>
+          <a:lstStyle>
+            <a:lvl1pPr>
+              <a:defRPr sz="2400"/>
+            </a:lvl1pPr>
+            <a:lvl2pPr>
+              <a:defRPr sz="2000"/>
+            </a:lvl2pPr>
+            <a:lvl3pPr>
+              <a:defRPr sz="1800"/>
+            </a:lvl3pPr>
+            <a:lvl4pPr>
+              <a:defRPr sz="1600"/>
+            </a:lvl4pPr>
+            <a:lvl5pPr>
+              <a:defRPr sz="1600"/>
+            </a:lvl5pPr>
+            <a:lvl6pPr>
+              <a:defRPr sz="1600"/>
+            </a:lvl6pPr>
+            <a:lvl7pPr>
+              <a:defRPr sz="1600"/>
+            </a:lvl7pPr>
+            <a:lvl8pPr>
+              <a:defRPr sz="1600"/>
+            </a:lvl8pPr>
+            <a:lvl9pPr>
+              <a:defRPr sz="1600"/>
+            </a:lvl9pPr>
+          </a:lstStyle>
           <a:p>
             <a:pPr lvl="0"/>
             <a:r>
@@ -2312,18 +2345,13 @@
               <a:rPr lang="en-US"/>
               <a:t>Fifth level</a:t>
             </a:r>
-          </a:p>
-        </p:txBody>
-      </p:sp>
-      <p:sp>
-        <p:nvSpPr>
-          <p:cNvPr id="7" name="Date Placeholder 6">
-            <a:extLst>
-              <a:ext uri="{FF2B5EF4-FFF2-40B4-BE49-F238E27FC236}">
-                <a16:creationId xmlns:a16="http://schemas.microsoft.com/office/drawing/2014/main" id="{4DD10974-7E64-4C2C-8257-38179C798D7F}"/>
-              </a:ext>
-            </a:extLst>
-          </p:cNvPr>
+            <a:endParaRPr lang="en-US" dirty="0"/>
+          </a:p>
+        </p:txBody>
+      </p:sp>
+      <p:sp>
+        <p:nvSpPr>
+          <p:cNvPr id="7" name="Date Placeholder 6"/>
           <p:cNvSpPr>
             <a:spLocks noGrp="1"/>
           </p:cNvSpPr>
@@ -2338,7 +2366,7 @@
           <a:p>
             <a:fld id="{A0AC53BF-8DB1-47AF-97BC-90D36A1106E6}" type="datetimeFigureOut">
               <a:rPr lang="en-US" smtClean="0"/>
-              <a:t>7/25/2018</a:t>
+              <a:t>7/26/2018</a:t>
             </a:fld>
             <a:endParaRPr lang="en-US"/>
           </a:p>
@@ -2346,13 +2374,7 @@
       </p:sp>
       <p:sp>
         <p:nvSpPr>
-          <p:cNvPr id="8" name="Footer Placeholder 7">
-            <a:extLst>
-              <a:ext uri="{FF2B5EF4-FFF2-40B4-BE49-F238E27FC236}">
-                <a16:creationId xmlns:a16="http://schemas.microsoft.com/office/drawing/2014/main" id="{79FAAC42-E5E5-4BB5-B767-C863AA791981}"/>
-              </a:ext>
-            </a:extLst>
-          </p:cNvPr>
+          <p:cNvPr id="8" name="Footer Placeholder 7"/>
           <p:cNvSpPr>
             <a:spLocks noGrp="1"/>
           </p:cNvSpPr>
@@ -2371,13 +2393,7 @@
       </p:sp>
       <p:sp>
         <p:nvSpPr>
-          <p:cNvPr id="9" name="Slide Number Placeholder 8">
-            <a:extLst>
-              <a:ext uri="{FF2B5EF4-FFF2-40B4-BE49-F238E27FC236}">
-                <a16:creationId xmlns:a16="http://schemas.microsoft.com/office/drawing/2014/main" id="{9DEB9B90-715B-48BD-8AE9-971AF1BEBEAF}"/>
-              </a:ext>
-            </a:extLst>
-          </p:cNvPr>
+          <p:cNvPr id="9" name="Slide Number Placeholder 8"/>
           <p:cNvSpPr>
             <a:spLocks noGrp="1"/>
           </p:cNvSpPr>
@@ -2401,7 +2417,7 @@
     </p:spTree>
     <p:extLst>
       <p:ext uri="{BB962C8B-B14F-4D97-AF65-F5344CB8AC3E}">
-        <p14:creationId xmlns:p14="http://schemas.microsoft.com/office/powerpoint/2010/main" val="786772016"/>
+        <p14:creationId xmlns:p14="http://schemas.microsoft.com/office/powerpoint/2010/main" val="2794877828"/>
       </p:ext>
     </p:extLst>
   </p:cSld>
@@ -2430,13 +2446,7 @@
       </p:grpSpPr>
       <p:sp>
         <p:nvSpPr>
-          <p:cNvPr id="2" name="Title 1">
-            <a:extLst>
-              <a:ext uri="{FF2B5EF4-FFF2-40B4-BE49-F238E27FC236}">
-                <a16:creationId xmlns:a16="http://schemas.microsoft.com/office/drawing/2014/main" id="{DD3A7BDC-C4F1-4D9B-AC98-9D4498196316}"/>
-              </a:ext>
-            </a:extLst>
-          </p:cNvPr>
+          <p:cNvPr id="6" name="Title 5"/>
           <p:cNvSpPr>
             <a:spLocks noGrp="1"/>
           </p:cNvSpPr>
@@ -2453,18 +2463,13 @@
               <a:rPr lang="en-US"/>
               <a:t>Click to edit Master title style</a:t>
             </a:r>
-          </a:p>
-        </p:txBody>
-      </p:sp>
-      <p:sp>
-        <p:nvSpPr>
-          <p:cNvPr id="3" name="Date Placeholder 2">
-            <a:extLst>
-              <a:ext uri="{FF2B5EF4-FFF2-40B4-BE49-F238E27FC236}">
-                <a16:creationId xmlns:a16="http://schemas.microsoft.com/office/drawing/2014/main" id="{E6F4B0FA-B799-4D26-9CC7-C1CDA6D14176}"/>
-              </a:ext>
-            </a:extLst>
-          </p:cNvPr>
+            <a:endParaRPr lang="en-US" dirty="0"/>
+          </a:p>
+        </p:txBody>
+      </p:sp>
+      <p:sp>
+        <p:nvSpPr>
+          <p:cNvPr id="3" name="Date Placeholder 2"/>
           <p:cNvSpPr>
             <a:spLocks noGrp="1"/>
           </p:cNvSpPr>
@@ -2479,7 +2484,7 @@
           <a:p>
             <a:fld id="{A0AC53BF-8DB1-47AF-97BC-90D36A1106E6}" type="datetimeFigureOut">
               <a:rPr lang="en-US" smtClean="0"/>
-              <a:t>7/25/2018</a:t>
+              <a:t>7/26/2018</a:t>
             </a:fld>
             <a:endParaRPr lang="en-US"/>
           </a:p>
@@ -2487,13 +2492,7 @@
       </p:sp>
       <p:sp>
         <p:nvSpPr>
-          <p:cNvPr id="4" name="Footer Placeholder 3">
-            <a:extLst>
-              <a:ext uri="{FF2B5EF4-FFF2-40B4-BE49-F238E27FC236}">
-                <a16:creationId xmlns:a16="http://schemas.microsoft.com/office/drawing/2014/main" id="{6C225518-DFAE-45CE-A21C-135C84E7EE37}"/>
-              </a:ext>
-            </a:extLst>
-          </p:cNvPr>
+          <p:cNvPr id="4" name="Footer Placeholder 3"/>
           <p:cNvSpPr>
             <a:spLocks noGrp="1"/>
           </p:cNvSpPr>
@@ -2512,13 +2511,7 @@
       </p:sp>
       <p:sp>
         <p:nvSpPr>
-          <p:cNvPr id="5" name="Slide Number Placeholder 4">
-            <a:extLst>
-              <a:ext uri="{FF2B5EF4-FFF2-40B4-BE49-F238E27FC236}">
-                <a16:creationId xmlns:a16="http://schemas.microsoft.com/office/drawing/2014/main" id="{8D05EB85-7223-4AD8-8083-61E6DA9B3347}"/>
-              </a:ext>
-            </a:extLst>
-          </p:cNvPr>
+          <p:cNvPr id="5" name="Slide Number Placeholder 4"/>
           <p:cNvSpPr>
             <a:spLocks noGrp="1"/>
           </p:cNvSpPr>
@@ -2542,7 +2535,7 @@
     </p:spTree>
     <p:extLst>
       <p:ext uri="{BB962C8B-B14F-4D97-AF65-F5344CB8AC3E}">
-        <p14:creationId xmlns:p14="http://schemas.microsoft.com/office/powerpoint/2010/main" val="3357230358"/>
+        <p14:creationId xmlns:p14="http://schemas.microsoft.com/office/powerpoint/2010/main" val="2108678381"/>
       </p:ext>
     </p:extLst>
   </p:cSld>
@@ -2571,13 +2564,7 @@
       </p:grpSpPr>
       <p:sp>
         <p:nvSpPr>
-          <p:cNvPr id="2" name="Date Placeholder 1">
-            <a:extLst>
-              <a:ext uri="{FF2B5EF4-FFF2-40B4-BE49-F238E27FC236}">
-                <a16:creationId xmlns:a16="http://schemas.microsoft.com/office/drawing/2014/main" id="{34863F2D-3DA0-4F8D-B217-ADF2C3ABFEFE}"/>
-              </a:ext>
-            </a:extLst>
-          </p:cNvPr>
+          <p:cNvPr id="2" name="Date Placeholder 1"/>
           <p:cNvSpPr>
             <a:spLocks noGrp="1"/>
           </p:cNvSpPr>
@@ -2592,7 +2579,7 @@
           <a:p>
             <a:fld id="{A0AC53BF-8DB1-47AF-97BC-90D36A1106E6}" type="datetimeFigureOut">
               <a:rPr lang="en-US" smtClean="0"/>
-              <a:t>7/25/2018</a:t>
+              <a:t>7/26/2018</a:t>
             </a:fld>
             <a:endParaRPr lang="en-US"/>
           </a:p>
@@ -2600,13 +2587,7 @@
       </p:sp>
       <p:sp>
         <p:nvSpPr>
-          <p:cNvPr id="3" name="Footer Placeholder 2">
-            <a:extLst>
-              <a:ext uri="{FF2B5EF4-FFF2-40B4-BE49-F238E27FC236}">
-                <a16:creationId xmlns:a16="http://schemas.microsoft.com/office/drawing/2014/main" id="{24A18E9B-4F58-4CEA-8487-6BBC197C90BD}"/>
-              </a:ext>
-            </a:extLst>
-          </p:cNvPr>
+          <p:cNvPr id="3" name="Footer Placeholder 2"/>
           <p:cNvSpPr>
             <a:spLocks noGrp="1"/>
           </p:cNvSpPr>
@@ -2625,13 +2606,7 @@
       </p:sp>
       <p:sp>
         <p:nvSpPr>
-          <p:cNvPr id="4" name="Slide Number Placeholder 3">
-            <a:extLst>
-              <a:ext uri="{FF2B5EF4-FFF2-40B4-BE49-F238E27FC236}">
-                <a16:creationId xmlns:a16="http://schemas.microsoft.com/office/drawing/2014/main" id="{56F0DAF0-4A1B-4491-80C2-9AACADF52872}"/>
-              </a:ext>
-            </a:extLst>
-          </p:cNvPr>
+          <p:cNvPr id="4" name="Slide Number Placeholder 3"/>
           <p:cNvSpPr>
             <a:spLocks noGrp="1"/>
           </p:cNvSpPr>
@@ -2655,7 +2630,7 @@
     </p:spTree>
     <p:extLst>
       <p:ext uri="{BB962C8B-B14F-4D97-AF65-F5344CB8AC3E}">
-        <p14:creationId xmlns:p14="http://schemas.microsoft.com/office/powerpoint/2010/main" val="1263060041"/>
+        <p14:creationId xmlns:p14="http://schemas.microsoft.com/office/powerpoint/2010/main" val="2812104420"/>
       </p:ext>
     </p:extLst>
   </p:cSld>
@@ -2684,31 +2659,69 @@
       </p:grpSpPr>
       <p:sp>
         <p:nvSpPr>
-          <p:cNvPr id="2" name="Title 1">
-            <a:extLst>
-              <a:ext uri="{FF2B5EF4-FFF2-40B4-BE49-F238E27FC236}">
-                <a16:creationId xmlns:a16="http://schemas.microsoft.com/office/drawing/2014/main" id="{1D2C9206-BF25-4A52-A7D9-07A13CA8B32A}"/>
-              </a:ext>
-            </a:extLst>
-          </p:cNvPr>
-          <p:cNvSpPr>
-            <a:spLocks noGrp="1"/>
-          </p:cNvSpPr>
-          <p:nvPr>
-            <p:ph type="title"/>
-          </p:nvPr>
+          <p:cNvPr id="2" name="Rectangle 1"/>
+          <p:cNvSpPr/>
+          <p:nvPr/>
         </p:nvSpPr>
         <p:spPr>
           <a:xfrm>
-            <a:off x="839788" y="457200"/>
-            <a:ext cx="3932237" cy="1600200"/>
+            <a:off x="7620000" y="0"/>
+            <a:ext cx="4572000" cy="6858000"/>
+          </a:xfrm>
+          <a:prstGeom prst="rect">
+            <a:avLst/>
+          </a:prstGeom>
+          <a:ln>
+            <a:noFill/>
+          </a:ln>
+        </p:spPr>
+        <p:style>
+          <a:lnRef idx="2">
+            <a:schemeClr val="accent1">
+              <a:shade val="50000"/>
+            </a:schemeClr>
+          </a:lnRef>
+          <a:fillRef idx="1">
+            <a:schemeClr val="accent1"/>
+          </a:fillRef>
+          <a:effectRef idx="0">
+            <a:schemeClr val="accent1"/>
+          </a:effectRef>
+          <a:fontRef idx="minor">
+            <a:schemeClr val="lt1"/>
+          </a:fontRef>
+        </p:style>
+      </p:sp>
+      <p:sp>
+        <p:nvSpPr>
+          <p:cNvPr id="9" name="Title 8"/>
+          <p:cNvSpPr>
+            <a:spLocks noGrp="1"/>
+          </p:cNvSpPr>
+          <p:nvPr>
+            <p:ph type="title"/>
+          </p:nvPr>
+        </p:nvSpPr>
+        <p:spPr>
+          <a:xfrm>
+            <a:off x="8261404" y="542282"/>
+            <a:ext cx="3383280" cy="1920240"/>
           </a:xfrm>
         </p:spPr>
         <p:txBody>
-          <a:bodyPr anchor="b"/>
+          <a:bodyPr anchor="b">
+            <a:noAutofit/>
+          </a:bodyPr>
           <a:lstStyle>
             <a:lvl1pPr>
-              <a:defRPr sz="3200"/>
+              <a:lnSpc>
+                <a:spcPct val="85000"/>
+              </a:lnSpc>
+              <a:defRPr sz="4000">
+                <a:solidFill>
+                  <a:srgbClr val="FFFFFF"/>
+                </a:solidFill>
+              </a:defRPr>
             </a:lvl1pPr>
           </a:lstStyle>
           <a:p>
@@ -2716,18 +2729,13 @@
               <a:rPr lang="en-US"/>
               <a:t>Click to edit Master title style</a:t>
             </a:r>
-          </a:p>
-        </p:txBody>
-      </p:sp>
-      <p:sp>
-        <p:nvSpPr>
-          <p:cNvPr id="3" name="Content Placeholder 2">
-            <a:extLst>
-              <a:ext uri="{FF2B5EF4-FFF2-40B4-BE49-F238E27FC236}">
-                <a16:creationId xmlns:a16="http://schemas.microsoft.com/office/drawing/2014/main" id="{893BEB06-C76F-4203-9781-0E0401C6BE72}"/>
-              </a:ext>
-            </a:extLst>
-          </p:cNvPr>
+            <a:endParaRPr lang="en-US" dirty="0"/>
+          </a:p>
+        </p:txBody>
+      </p:sp>
+      <p:sp>
+        <p:nvSpPr>
+          <p:cNvPr id="3" name="Content Placeholder 2"/>
           <p:cNvSpPr>
             <a:spLocks noGrp="1"/>
           </p:cNvSpPr>
@@ -2737,8 +2745,8 @@
         </p:nvSpPr>
         <p:spPr>
           <a:xfrm>
-            <a:off x="5183188" y="987425"/>
-            <a:ext cx="6172200" cy="4873625"/>
+            <a:off x="762000" y="762000"/>
+            <a:ext cx="6096000" cy="4572000"/>
           </a:xfrm>
         </p:spPr>
         <p:txBody>
@@ -2806,18 +2814,13 @@
               <a:rPr lang="en-US"/>
               <a:t>Fifth level</a:t>
             </a:r>
-          </a:p>
-        </p:txBody>
-      </p:sp>
-      <p:sp>
-        <p:nvSpPr>
-          <p:cNvPr id="4" name="Text Placeholder 3">
-            <a:extLst>
-              <a:ext uri="{FF2B5EF4-FFF2-40B4-BE49-F238E27FC236}">
-                <a16:creationId xmlns:a16="http://schemas.microsoft.com/office/drawing/2014/main" id="{60369F9E-9CE4-4A18-AA8E-55ABE72B184C}"/>
-              </a:ext>
-            </a:extLst>
-          </p:cNvPr>
+            <a:endParaRPr lang="en-US" dirty="0"/>
+          </a:p>
+        </p:txBody>
+      </p:sp>
+      <p:sp>
+        <p:nvSpPr>
+          <p:cNvPr id="4" name="Text Placeholder 3"/>
           <p:cNvSpPr>
             <a:spLocks noGrp="1"/>
           </p:cNvSpPr>
@@ -2827,52 +2830,87 @@
         </p:nvSpPr>
         <p:spPr>
           <a:xfrm>
-            <a:off x="839788" y="2057400"/>
-            <a:ext cx="3932237" cy="3811588"/>
+            <a:off x="8275982" y="2511813"/>
+            <a:ext cx="3398520" cy="3126987"/>
           </a:xfrm>
         </p:spPr>
         <p:txBody>
-          <a:bodyPr/>
+          <a:bodyPr>
+            <a:normAutofit/>
+          </a:bodyPr>
           <a:lstStyle>
-            <a:lvl1pPr marL="0" indent="0">
-              <a:buNone/>
-              <a:defRPr sz="1600"/>
+            <a:lvl1pPr marL="0" marR="0" indent="0" algn="l" defTabSz="914400" rtl="0" eaLnBrk="1" fontAlgn="auto" latinLnBrk="0" hangingPunct="1">
+              <a:lnSpc>
+                <a:spcPct val="100000"/>
+              </a:lnSpc>
+              <a:spcBef>
+                <a:spcPts val="1200"/>
+              </a:spcBef>
+              <a:spcAft>
+                <a:spcPts val="0"/>
+              </a:spcAft>
+              <a:buClrTx/>
+              <a:buSzTx/>
+              <a:buFontTx/>
+              <a:buNone/>
+              <a:tabLst/>
+              <a:defRPr sz="1800">
+                <a:solidFill>
+                  <a:srgbClr val="262626"/>
+                </a:solidFill>
+              </a:defRPr>
             </a:lvl1pPr>
             <a:lvl2pPr marL="457200" indent="0">
               <a:buNone/>
-              <a:defRPr sz="1400"/>
+              <a:defRPr sz="1200"/>
             </a:lvl2pPr>
             <a:lvl3pPr marL="914400" indent="0">
               <a:buNone/>
-              <a:defRPr sz="1200"/>
+              <a:defRPr sz="1000"/>
             </a:lvl3pPr>
             <a:lvl4pPr marL="1371600" indent="0">
               <a:buNone/>
-              <a:defRPr sz="1000"/>
+              <a:defRPr sz="900"/>
             </a:lvl4pPr>
             <a:lvl5pPr marL="1828800" indent="0">
               <a:buNone/>
-              <a:defRPr sz="1000"/>
+              <a:defRPr sz="900"/>
             </a:lvl5pPr>
             <a:lvl6pPr marL="2286000" indent="0">
               <a:buNone/>
-              <a:defRPr sz="1000"/>
+              <a:defRPr sz="900"/>
             </a:lvl6pPr>
             <a:lvl7pPr marL="2743200" indent="0">
               <a:buNone/>
-              <a:defRPr sz="1000"/>
+              <a:defRPr sz="900"/>
             </a:lvl7pPr>
             <a:lvl8pPr marL="3200400" indent="0">
               <a:buNone/>
-              <a:defRPr sz="1000"/>
+              <a:defRPr sz="900"/>
             </a:lvl8pPr>
             <a:lvl9pPr marL="3657600" indent="0">
               <a:buNone/>
-              <a:defRPr sz="1000"/>
+              <a:defRPr sz="900"/>
             </a:lvl9pPr>
           </a:lstStyle>
           <a:p>
-            <a:pPr lvl="0"/>
+            <a:pPr marL="0" marR="0" lvl="0" indent="0" algn="l" defTabSz="914400" rtl="0" eaLnBrk="1" fontAlgn="auto" latinLnBrk="0" hangingPunct="1">
+              <a:lnSpc>
+                <a:spcPct val="100000"/>
+              </a:lnSpc>
+              <a:spcBef>
+                <a:spcPts val="1400"/>
+              </a:spcBef>
+              <a:spcAft>
+                <a:spcPts val="0"/>
+              </a:spcAft>
+              <a:buClrTx/>
+              <a:buSzTx/>
+              <a:buFontTx/>
+              <a:buNone/>
+              <a:tabLst/>
+              <a:defRPr/>
+            </a:pPr>
             <a:r>
               <a:rPr lang="en-US"/>
               <a:t>Edit Master text styles</a:t>
@@ -2882,13 +2920,7 @@
       </p:sp>
       <p:sp>
         <p:nvSpPr>
-          <p:cNvPr id="5" name="Date Placeholder 4">
-            <a:extLst>
-              <a:ext uri="{FF2B5EF4-FFF2-40B4-BE49-F238E27FC236}">
-                <a16:creationId xmlns:a16="http://schemas.microsoft.com/office/drawing/2014/main" id="{F39177E6-227E-493F-8C0F-3F51E57F5B27}"/>
-              </a:ext>
-            </a:extLst>
-          </p:cNvPr>
+          <p:cNvPr id="5" name="Date Placeholder 4"/>
           <p:cNvSpPr>
             <a:spLocks noGrp="1"/>
           </p:cNvSpPr>
@@ -2903,7 +2935,7 @@
           <a:p>
             <a:fld id="{A0AC53BF-8DB1-47AF-97BC-90D36A1106E6}" type="datetimeFigureOut">
               <a:rPr lang="en-US" smtClean="0"/>
-              <a:t>7/25/2018</a:t>
+              <a:t>7/26/2018</a:t>
             </a:fld>
             <a:endParaRPr lang="en-US"/>
           </a:p>
@@ -2911,13 +2943,7 @@
       </p:sp>
       <p:sp>
         <p:nvSpPr>
-          <p:cNvPr id="6" name="Footer Placeholder 5">
-            <a:extLst>
-              <a:ext uri="{FF2B5EF4-FFF2-40B4-BE49-F238E27FC236}">
-                <a16:creationId xmlns:a16="http://schemas.microsoft.com/office/drawing/2014/main" id="{DC806EFC-F553-4141-AF88-5CAABC6A1734}"/>
-              </a:ext>
-            </a:extLst>
-          </p:cNvPr>
+          <p:cNvPr id="6" name="Footer Placeholder 5"/>
           <p:cNvSpPr>
             <a:spLocks noGrp="1"/>
           </p:cNvSpPr>
@@ -2936,13 +2962,7 @@
       </p:sp>
       <p:sp>
         <p:nvSpPr>
-          <p:cNvPr id="7" name="Slide Number Placeholder 6">
-            <a:extLst>
-              <a:ext uri="{FF2B5EF4-FFF2-40B4-BE49-F238E27FC236}">
-                <a16:creationId xmlns:a16="http://schemas.microsoft.com/office/drawing/2014/main" id="{E6A9DC59-B0DC-42AA-B497-9069C24A9176}"/>
-              </a:ext>
-            </a:extLst>
-          </p:cNvPr>
+          <p:cNvPr id="7" name="Slide Number Placeholder 6"/>
           <p:cNvSpPr>
             <a:spLocks noGrp="1"/>
           </p:cNvSpPr>
@@ -2953,7 +2973,17 @@
         <p:spPr/>
         <p:txBody>
           <a:bodyPr/>
-          <a:lstStyle/>
+          <a:lstStyle>
+            <a:lvl1pPr>
+              <a:defRPr>
+                <a:solidFill>
+                  <a:srgbClr val="FFFFFF">
+                    <a:alpha val="20000"/>
+                  </a:srgbClr>
+                </a:solidFill>
+              </a:defRPr>
+            </a:lvl1pPr>
+          </a:lstStyle>
           <a:p>
             <a:fld id="{15511D67-0B82-4F97-9792-D4DFE857E145}" type="slidenum">
               <a:rPr lang="en-US" smtClean="0"/>
@@ -2966,7 +2996,7 @@
     </p:spTree>
     <p:extLst>
       <p:ext uri="{BB962C8B-B14F-4D97-AF65-F5344CB8AC3E}">
-        <p14:creationId xmlns:p14="http://schemas.microsoft.com/office/powerpoint/2010/main" val="3482049089"/>
+        <p14:creationId xmlns:p14="http://schemas.microsoft.com/office/powerpoint/2010/main" val="2988667844"/>
       </p:ext>
     </p:extLst>
   </p:cSld>
@@ -2979,6 +3009,14 @@
 <file path=ppt/slideLayouts/slideLayout9.xml><?xml version="1.0" encoding="utf-8"?>
 <p:sldLayout xmlns:a="http://schemas.openxmlformats.org/drawingml/2006/main" xmlns:r="http://schemas.openxmlformats.org/officeDocument/2006/relationships" xmlns:p="http://schemas.openxmlformats.org/presentationml/2006/main" type="picTx" preserve="1">
   <p:cSld name="Picture with Caption">
+    <p:bg>
+      <p:bgPr>
+        <a:solidFill>
+          <a:schemeClr val="accent1"/>
+        </a:solidFill>
+        <a:effectLst/>
+      </p:bgPr>
+    </p:bg>
     <p:spTree>
       <p:nvGrpSpPr>
         <p:cNvPr id="1" name=""/>
@@ -2995,13 +3033,7 @@
       </p:grpSpPr>
       <p:sp>
         <p:nvSpPr>
-          <p:cNvPr id="2" name="Title 1">
-            <a:extLst>
-              <a:ext uri="{FF2B5EF4-FFF2-40B4-BE49-F238E27FC236}">
-                <a16:creationId xmlns:a16="http://schemas.microsoft.com/office/drawing/2014/main" id="{6E0B030C-2C2B-4CEB-9EDD-28885B855166}"/>
-              </a:ext>
-            </a:extLst>
-          </p:cNvPr>
+          <p:cNvPr id="2" name="Title 1"/>
           <p:cNvSpPr>
             <a:spLocks noGrp="1"/>
           </p:cNvSpPr>
@@ -3011,15 +3043,21 @@
         </p:nvSpPr>
         <p:spPr>
           <a:xfrm>
-            <a:off x="839788" y="457200"/>
-            <a:ext cx="3932237" cy="1600200"/>
+            <a:off x="649224" y="5418667"/>
+            <a:ext cx="10780776" cy="613283"/>
           </a:xfrm>
         </p:spPr>
         <p:txBody>
-          <a:bodyPr anchor="b"/>
+          <a:bodyPr anchor="b">
+            <a:normAutofit/>
+          </a:bodyPr>
           <a:lstStyle>
             <a:lvl1pPr>
-              <a:defRPr sz="3200"/>
+              <a:defRPr sz="3200" b="0">
+                <a:solidFill>
+                  <a:srgbClr val="FFFFFF"/>
+                </a:solidFill>
+              </a:defRPr>
             </a:lvl1pPr>
           </a:lstStyle>
           <a:p>
@@ -3027,20 +3065,15 @@
               <a:rPr lang="en-US"/>
               <a:t>Click to edit Master title style</a:t>
             </a:r>
-          </a:p>
-        </p:txBody>
-      </p:sp>
-      <p:sp>
-        <p:nvSpPr>
-          <p:cNvPr id="3" name="Picture Placeholder 2">
-            <a:extLst>
-              <a:ext uri="{FF2B5EF4-FFF2-40B4-BE49-F238E27FC236}">
-                <a16:creationId xmlns:a16="http://schemas.microsoft.com/office/drawing/2014/main" id="{E1561696-721B-4585-9DC0-406AFA16AE8C}"/>
-              </a:ext>
-            </a:extLst>
-          </p:cNvPr>
-          <p:cNvSpPr>
-            <a:spLocks noGrp="1"/>
+            <a:endParaRPr lang="en-US" dirty="0"/>
+          </a:p>
+        </p:txBody>
+      </p:sp>
+      <p:sp>
+        <p:nvSpPr>
+          <p:cNvPr id="3" name="Picture Placeholder 2"/>
+          <p:cNvSpPr>
+            <a:spLocks noGrp="1" noChangeAspect="1"/>
           </p:cNvSpPr>
           <p:nvPr>
             <p:ph type="pic" idx="1"/>
@@ -3048,16 +3081,32 @@
         </p:nvSpPr>
         <p:spPr>
           <a:xfrm>
-            <a:off x="5183188" y="987425"/>
-            <a:ext cx="6172200" cy="4873625"/>
+            <a:off x="0" y="0"/>
+            <a:ext cx="12192000" cy="5330952"/>
           </a:xfrm>
+          <a:solidFill>
+            <a:schemeClr val="accent1">
+              <a:lumMod val="40000"/>
+              <a:lumOff val="60000"/>
+            </a:schemeClr>
+          </a:solidFill>
         </p:spPr>
         <p:txBody>
-          <a:bodyPr/>
+          <a:bodyPr anchor="t"/>
           <a:lstStyle>
-            <a:lvl1pPr marL="0" indent="0">
-              <a:buNone/>
-              <a:defRPr sz="3200"/>
+            <a:lvl1pPr marL="0" indent="0" algn="ctr">
+              <a:spcBef>
+                <a:spcPts val="800"/>
+              </a:spcBef>
+              <a:buNone/>
+              <a:defRPr sz="3200">
+                <a:solidFill>
+                  <a:schemeClr val="tx1">
+                    <a:lumMod val="75000"/>
+                    <a:lumOff val="25000"/>
+                  </a:schemeClr>
+                </a:solidFill>
+              </a:defRPr>
             </a:lvl1pPr>
             <a:lvl2pPr marL="457200" indent="0">
               <a:buNone/>
@@ -3093,19 +3142,17 @@
             </a:lvl9pPr>
           </a:lstStyle>
           <a:p>
-            <a:endParaRPr lang="en-US"/>
-          </a:p>
-        </p:txBody>
-      </p:sp>
-      <p:sp>
-        <p:nvSpPr>
-          <p:cNvPr id="4" name="Text Placeholder 3">
-            <a:extLst>
-              <a:ext uri="{FF2B5EF4-FFF2-40B4-BE49-F238E27FC236}">
-                <a16:creationId xmlns:a16="http://schemas.microsoft.com/office/drawing/2014/main" id="{27657DE2-F788-40F9-A105-763661BB77D2}"/>
-              </a:ext>
-            </a:extLst>
-          </p:cNvPr>
+            <a:r>
+              <a:rPr lang="en-US"/>
+              <a:t>Click icon to add picture</a:t>
+            </a:r>
+            <a:endParaRPr lang="en-US" dirty="0"/>
+          </a:p>
+        </p:txBody>
+      </p:sp>
+      <p:sp>
+        <p:nvSpPr>
+          <p:cNvPr id="4" name="Text Placeholder 3"/>
           <p:cNvSpPr>
             <a:spLocks noGrp="1"/>
           </p:cNvSpPr>
@@ -3115,48 +3162,57 @@
         </p:nvSpPr>
         <p:spPr>
           <a:xfrm>
-            <a:off x="839788" y="2057400"/>
-            <a:ext cx="3932237" cy="3811588"/>
+            <a:off x="676656" y="5909735"/>
+            <a:ext cx="9229344" cy="533400"/>
           </a:xfrm>
         </p:spPr>
         <p:txBody>
-          <a:bodyPr/>
+          <a:bodyPr>
+            <a:normAutofit/>
+          </a:bodyPr>
           <a:lstStyle>
             <a:lvl1pPr marL="0" indent="0">
-              <a:buNone/>
-              <a:defRPr sz="1600"/>
+              <a:lnSpc>
+                <a:spcPct val="90000"/>
+              </a:lnSpc>
+              <a:buNone/>
+              <a:defRPr sz="1400">
+                <a:solidFill>
+                  <a:srgbClr val="262626"/>
+                </a:solidFill>
+              </a:defRPr>
             </a:lvl1pPr>
             <a:lvl2pPr marL="457200" indent="0">
               <a:buNone/>
-              <a:defRPr sz="1400"/>
+              <a:defRPr sz="1200"/>
             </a:lvl2pPr>
             <a:lvl3pPr marL="914400" indent="0">
               <a:buNone/>
-              <a:defRPr sz="1200"/>
+              <a:defRPr sz="1000"/>
             </a:lvl3pPr>
             <a:lvl4pPr marL="1371600" indent="0">
               <a:buNone/>
-              <a:defRPr sz="1000"/>
+              <a:defRPr sz="900"/>
             </a:lvl4pPr>
             <a:lvl5pPr marL="1828800" indent="0">
               <a:buNone/>
-              <a:defRPr sz="1000"/>
+              <a:defRPr sz="900"/>
             </a:lvl5pPr>
             <a:lvl6pPr marL="2286000" indent="0">
               <a:buNone/>
-              <a:defRPr sz="1000"/>
+              <a:defRPr sz="900"/>
             </a:lvl6pPr>
             <a:lvl7pPr marL="2743200" indent="0">
               <a:buNone/>
-              <a:defRPr sz="1000"/>
+              <a:defRPr sz="900"/>
             </a:lvl7pPr>
             <a:lvl8pPr marL="3200400" indent="0">
               <a:buNone/>
-              <a:defRPr sz="1000"/>
+              <a:defRPr sz="900"/>
             </a:lvl8pPr>
             <a:lvl9pPr marL="3657600" indent="0">
               <a:buNone/>
-              <a:defRPr sz="1000"/>
+              <a:defRPr sz="900"/>
             </a:lvl9pPr>
           </a:lstStyle>
           <a:p>
@@ -3170,13 +3226,7 @@
       </p:sp>
       <p:sp>
         <p:nvSpPr>
-          <p:cNvPr id="5" name="Date Placeholder 4">
-            <a:extLst>
-              <a:ext uri="{FF2B5EF4-FFF2-40B4-BE49-F238E27FC236}">
-                <a16:creationId xmlns:a16="http://schemas.microsoft.com/office/drawing/2014/main" id="{A663369F-81C7-4497-A1E4-F0329986C720}"/>
-              </a:ext>
-            </a:extLst>
-          </p:cNvPr>
+          <p:cNvPr id="12" name="Date Placeholder 11"/>
           <p:cNvSpPr>
             <a:spLocks noGrp="1"/>
           </p:cNvSpPr>
@@ -3187,11 +3237,21 @@
         <p:spPr/>
         <p:txBody>
           <a:bodyPr/>
-          <a:lstStyle/>
+          <a:lstStyle>
+            <a:lvl1pPr>
+              <a:defRPr>
+                <a:solidFill>
+                  <a:srgbClr val="FFFFFF">
+                    <a:alpha val="80000"/>
+                  </a:srgbClr>
+                </a:solidFill>
+              </a:defRPr>
+            </a:lvl1pPr>
+          </a:lstStyle>
           <a:p>
             <a:fld id="{A0AC53BF-8DB1-47AF-97BC-90D36A1106E6}" type="datetimeFigureOut">
               <a:rPr lang="en-US" smtClean="0"/>
-              <a:t>7/25/2018</a:t>
+              <a:t>7/26/2018</a:t>
             </a:fld>
             <a:endParaRPr lang="en-US"/>
           </a:p>
@@ -3199,13 +3259,7 @@
       </p:sp>
       <p:sp>
         <p:nvSpPr>
-          <p:cNvPr id="6" name="Footer Placeholder 5">
-            <a:extLst>
-              <a:ext uri="{FF2B5EF4-FFF2-40B4-BE49-F238E27FC236}">
-                <a16:creationId xmlns:a16="http://schemas.microsoft.com/office/drawing/2014/main" id="{31C43266-8078-454D-B76D-ED91ECE978D5}"/>
-              </a:ext>
-            </a:extLst>
-          </p:cNvPr>
+          <p:cNvPr id="13" name="Footer Placeholder 12"/>
           <p:cNvSpPr>
             <a:spLocks noGrp="1"/>
           </p:cNvSpPr>
@@ -3216,7 +3270,17 @@
         <p:spPr/>
         <p:txBody>
           <a:bodyPr/>
-          <a:lstStyle/>
+          <a:lstStyle>
+            <a:lvl1pPr>
+              <a:defRPr>
+                <a:solidFill>
+                  <a:srgbClr val="FFFFFF">
+                    <a:alpha val="80000"/>
+                  </a:srgbClr>
+                </a:solidFill>
+              </a:defRPr>
+            </a:lvl1pPr>
+          </a:lstStyle>
           <a:p>
             <a:endParaRPr lang="en-US"/>
           </a:p>
@@ -3224,13 +3288,7 @@
       </p:sp>
       <p:sp>
         <p:nvSpPr>
-          <p:cNvPr id="7" name="Slide Number Placeholder 6">
-            <a:extLst>
-              <a:ext uri="{FF2B5EF4-FFF2-40B4-BE49-F238E27FC236}">
-                <a16:creationId xmlns:a16="http://schemas.microsoft.com/office/drawing/2014/main" id="{A07F1337-596F-4B13-B356-1AA822F56761}"/>
-              </a:ext>
-            </a:extLst>
-          </p:cNvPr>
+          <p:cNvPr id="14" name="Slide Number Placeholder 13"/>
           <p:cNvSpPr>
             <a:spLocks noGrp="1"/>
           </p:cNvSpPr>
@@ -3241,7 +3299,17 @@
         <p:spPr/>
         <p:txBody>
           <a:bodyPr/>
-          <a:lstStyle/>
+          <a:lstStyle>
+            <a:lvl1pPr>
+              <a:defRPr>
+                <a:solidFill>
+                  <a:srgbClr val="FFFFFF">
+                    <a:alpha val="25000"/>
+                  </a:srgbClr>
+                </a:solidFill>
+              </a:defRPr>
+            </a:lvl1pPr>
+          </a:lstStyle>
           <a:p>
             <a:fld id="{15511D67-0B82-4F97-9792-D4DFE857E145}" type="slidenum">
               <a:rPr lang="en-US" smtClean="0"/>
@@ -3254,12 +3322,12 @@
     </p:spTree>
     <p:extLst>
       <p:ext uri="{BB962C8B-B14F-4D97-AF65-F5344CB8AC3E}">
-        <p14:creationId xmlns:p14="http://schemas.microsoft.com/office/powerpoint/2010/main" val="4096238635"/>
+        <p14:creationId xmlns:p14="http://schemas.microsoft.com/office/powerpoint/2010/main" val="2632115174"/>
       </p:ext>
     </p:extLst>
   </p:cSld>
   <p:clrMapOvr>
-    <a:masterClrMapping/>
+    <a:overrideClrMapping bg1="lt1" tx1="dk1" bg2="lt2" tx2="dk2" accent1="accent1" accent2="accent2" accent3="accent3" accent4="accent4" accent5="accent5" accent6="accent6" hlink="hlink" folHlink="folHlink"/>
   </p:clrMapOvr>
 </p:sldLayout>
 </file>
@@ -3288,13 +3356,7 @@
       </p:grpSpPr>
       <p:sp>
         <p:nvSpPr>
-          <p:cNvPr id="2" name="Title Placeholder 1">
-            <a:extLst>
-              <a:ext uri="{FF2B5EF4-FFF2-40B4-BE49-F238E27FC236}">
-                <a16:creationId xmlns:a16="http://schemas.microsoft.com/office/drawing/2014/main" id="{59BB5396-FCFC-4524-878F-40DB99CE1A38}"/>
-              </a:ext>
-            </a:extLst>
-          </p:cNvPr>
+          <p:cNvPr id="2" name="Title Placeholder 1"/>
           <p:cNvSpPr>
             <a:spLocks noGrp="1"/>
           </p:cNvSpPr>
@@ -3304,8 +3366,8 @@
         </p:nvSpPr>
         <p:spPr>
           <a:xfrm>
-            <a:off x="838200" y="365125"/>
-            <a:ext cx="10515600" cy="1325563"/>
+            <a:off x="657224" y="499533"/>
+            <a:ext cx="10772775" cy="1658198"/>
           </a:xfrm>
           <a:prstGeom prst="rect">
             <a:avLst/>
@@ -3321,18 +3383,13 @@
               <a:rPr lang="en-US"/>
               <a:t>Click to edit Master title style</a:t>
             </a:r>
-          </a:p>
-        </p:txBody>
-      </p:sp>
-      <p:sp>
-        <p:nvSpPr>
-          <p:cNvPr id="3" name="Text Placeholder 2">
-            <a:extLst>
-              <a:ext uri="{FF2B5EF4-FFF2-40B4-BE49-F238E27FC236}">
-                <a16:creationId xmlns:a16="http://schemas.microsoft.com/office/drawing/2014/main" id="{ED35BA75-9748-48CB-95CB-0C72C3DB9468}"/>
-              </a:ext>
-            </a:extLst>
-          </p:cNvPr>
+            <a:endParaRPr lang="en-US" dirty="0"/>
+          </a:p>
+        </p:txBody>
+      </p:sp>
+      <p:sp>
+        <p:nvSpPr>
+          <p:cNvPr id="3" name="Text Placeholder 2"/>
           <p:cNvSpPr>
             <a:spLocks noGrp="1"/>
           </p:cNvSpPr>
@@ -3342,8 +3399,8 @@
         </p:nvSpPr>
         <p:spPr>
           <a:xfrm>
-            <a:off x="838200" y="1825625"/>
-            <a:ext cx="10515600" cy="4351338"/>
+            <a:off x="676656" y="2011680"/>
+            <a:ext cx="10753725" cy="3766185"/>
           </a:xfrm>
           <a:prstGeom prst="rect">
             <a:avLst/>
@@ -3388,18 +3445,13 @@
               <a:rPr lang="en-US"/>
               <a:t>Fifth level</a:t>
             </a:r>
-          </a:p>
-        </p:txBody>
-      </p:sp>
-      <p:sp>
-        <p:nvSpPr>
-          <p:cNvPr id="4" name="Date Placeholder 3">
-            <a:extLst>
-              <a:ext uri="{FF2B5EF4-FFF2-40B4-BE49-F238E27FC236}">
-                <a16:creationId xmlns:a16="http://schemas.microsoft.com/office/drawing/2014/main" id="{D661F841-4981-45B3-86F1-C49D6DFA5B4E}"/>
-              </a:ext>
-            </a:extLst>
-          </p:cNvPr>
+            <a:endParaRPr lang="en-US" dirty="0"/>
+          </a:p>
+        </p:txBody>
+      </p:sp>
+      <p:sp>
+        <p:nvSpPr>
+          <p:cNvPr id="4" name="Date Placeholder 3"/>
           <p:cNvSpPr>
             <a:spLocks noGrp="1"/>
           </p:cNvSpPr>
@@ -3409,8 +3461,8 @@
         </p:nvSpPr>
         <p:spPr>
           <a:xfrm>
-            <a:off x="838200" y="6356350"/>
-            <a:ext cx="2743200" cy="365125"/>
+            <a:off x="685800" y="6412447"/>
+            <a:ext cx="4114800" cy="228600"/>
           </a:xfrm>
           <a:prstGeom prst="rect">
             <a:avLst/>
@@ -3420,10 +3472,10 @@
           <a:bodyPr vert="horz" lIns="91440" tIns="45720" rIns="91440" bIns="45720" rtlCol="0" anchor="ctr"/>
           <a:lstStyle>
             <a:lvl1pPr algn="l">
-              <a:defRPr sz="1200">
+              <a:defRPr sz="950">
                 <a:solidFill>
                   <a:schemeClr val="tx1">
-                    <a:tint val="75000"/>
+                    <a:alpha val="80000"/>
                   </a:schemeClr>
                 </a:solidFill>
               </a:defRPr>
@@ -3432,7 +3484,7 @@
           <a:p>
             <a:fld id="{A0AC53BF-8DB1-47AF-97BC-90D36A1106E6}" type="datetimeFigureOut">
               <a:rPr lang="en-US" smtClean="0"/>
-              <a:t>7/25/2018</a:t>
+              <a:t>7/26/2018</a:t>
             </a:fld>
             <a:endParaRPr lang="en-US"/>
           </a:p>
@@ -3440,13 +3492,7 @@
       </p:sp>
       <p:sp>
         <p:nvSpPr>
-          <p:cNvPr id="5" name="Footer Placeholder 4">
-            <a:extLst>
-              <a:ext uri="{FF2B5EF4-FFF2-40B4-BE49-F238E27FC236}">
-                <a16:creationId xmlns:a16="http://schemas.microsoft.com/office/drawing/2014/main" id="{DCFA990E-8D25-4561-B2A1-C4F6422DD4F4}"/>
-              </a:ext>
-            </a:extLst>
-          </p:cNvPr>
+          <p:cNvPr id="5" name="Footer Placeholder 4"/>
           <p:cNvSpPr>
             <a:spLocks noGrp="1"/>
           </p:cNvSpPr>
@@ -3456,8 +3502,8 @@
         </p:nvSpPr>
         <p:spPr>
           <a:xfrm>
-            <a:off x="4038600" y="6356350"/>
-            <a:ext cx="4114800" cy="365125"/>
+            <a:off x="685800" y="6554697"/>
+            <a:ext cx="5029200" cy="228600"/>
           </a:xfrm>
           <a:prstGeom prst="rect">
             <a:avLst/>
@@ -3466,11 +3512,11 @@
         <p:txBody>
           <a:bodyPr vert="horz" lIns="91440" tIns="45720" rIns="91440" bIns="45720" rtlCol="0" anchor="ctr"/>
           <a:lstStyle>
-            <a:lvl1pPr algn="ctr">
-              <a:defRPr sz="1200">
+            <a:lvl1pPr algn="l">
+              <a:defRPr sz="950" cap="all" baseline="0">
                 <a:solidFill>
                   <a:schemeClr val="tx1">
-                    <a:tint val="75000"/>
+                    <a:alpha val="80000"/>
                   </a:schemeClr>
                 </a:solidFill>
               </a:defRPr>
@@ -3483,13 +3529,7 @@
       </p:sp>
       <p:sp>
         <p:nvSpPr>
-          <p:cNvPr id="6" name="Slide Number Placeholder 5">
-            <a:extLst>
-              <a:ext uri="{FF2B5EF4-FFF2-40B4-BE49-F238E27FC236}">
-                <a16:creationId xmlns:a16="http://schemas.microsoft.com/office/drawing/2014/main" id="{DD6FA5BF-4E98-4687-B09E-E9FE4CE7F8CD}"/>
-              </a:ext>
-            </a:extLst>
-          </p:cNvPr>
+          <p:cNvPr id="6" name="Slide Number Placeholder 5"/>
           <p:cNvSpPr>
             <a:spLocks noGrp="1"/>
           </p:cNvSpPr>
@@ -3499,23 +3539,27 @@
         </p:nvSpPr>
         <p:spPr>
           <a:xfrm>
-            <a:off x="8610600" y="6356350"/>
-            <a:ext cx="2743200" cy="365125"/>
+            <a:off x="8763926" y="5876412"/>
+            <a:ext cx="2926080" cy="1397039"/>
           </a:xfrm>
           <a:prstGeom prst="rect">
             <a:avLst/>
           </a:prstGeom>
         </p:spPr>
         <p:txBody>
-          <a:bodyPr vert="horz" lIns="91440" tIns="45720" rIns="91440" bIns="45720" rtlCol="0" anchor="ctr"/>
+          <a:bodyPr vert="horz" lIns="91440" tIns="45720" rIns="91440" bIns="45720" rtlCol="0" anchor="b"/>
           <a:lstStyle>
             <a:lvl1pPr algn="r">
-              <a:defRPr sz="1200">
+              <a:defRPr sz="10300" b="0">
+                <a:ln>
+                  <a:noFill/>
+                </a:ln>
                 <a:solidFill>
-                  <a:schemeClr val="tx1">
-                    <a:tint val="75000"/>
+                  <a:schemeClr val="accent1">
+                    <a:alpha val="25000"/>
                   </a:schemeClr>
                 </a:solidFill>
+                <a:latin typeface="+mj-lt"/>
               </a:defRPr>
             </a:lvl1pPr>
           </a:lstStyle>
@@ -3531,37 +3575,37 @@
     </p:spTree>
     <p:extLst>
       <p:ext uri="{BB962C8B-B14F-4D97-AF65-F5344CB8AC3E}">
-        <p14:creationId xmlns:p14="http://schemas.microsoft.com/office/powerpoint/2010/main" val="1294367881"/>
+        <p14:creationId xmlns:p14="http://schemas.microsoft.com/office/powerpoint/2010/main" val="156522834"/>
       </p:ext>
     </p:extLst>
   </p:cSld>
   <p:clrMap bg1="lt1" tx1="dk1" bg2="lt2" tx2="dk2" accent1="accent1" accent2="accent2" accent3="accent3" accent4="accent4" accent5="accent5" accent6="accent6" hlink="hlink" folHlink="folHlink"/>
   <p:sldLayoutIdLst>
-    <p:sldLayoutId id="2147483649" r:id="rId1"/>
-    <p:sldLayoutId id="2147483650" r:id="rId2"/>
-    <p:sldLayoutId id="2147483651" r:id="rId3"/>
-    <p:sldLayoutId id="2147483652" r:id="rId4"/>
-    <p:sldLayoutId id="2147483653" r:id="rId5"/>
-    <p:sldLayoutId id="2147483654" r:id="rId6"/>
-    <p:sldLayoutId id="2147483655" r:id="rId7"/>
-    <p:sldLayoutId id="2147483656" r:id="rId8"/>
-    <p:sldLayoutId id="2147483657" r:id="rId9"/>
-    <p:sldLayoutId id="2147483658" r:id="rId10"/>
-    <p:sldLayoutId id="2147483659" r:id="rId11"/>
+    <p:sldLayoutId id="2147483661" r:id="rId1"/>
+    <p:sldLayoutId id="2147483662" r:id="rId2"/>
+    <p:sldLayoutId id="2147483663" r:id="rId3"/>
+    <p:sldLayoutId id="2147483664" r:id="rId4"/>
+    <p:sldLayoutId id="2147483665" r:id="rId5"/>
+    <p:sldLayoutId id="2147483666" r:id="rId6"/>
+    <p:sldLayoutId id="2147483667" r:id="rId7"/>
+    <p:sldLayoutId id="2147483668" r:id="rId8"/>
+    <p:sldLayoutId id="2147483669" r:id="rId9"/>
+    <p:sldLayoutId id="2147483670" r:id="rId10"/>
+    <p:sldLayoutId id="2147483671" r:id="rId11"/>
   </p:sldLayoutIdLst>
   <p:txStyles>
     <p:titleStyle>
       <a:lvl1pPr algn="l" defTabSz="914400" rtl="0" eaLnBrk="1" latinLnBrk="0" hangingPunct="1">
         <a:lnSpc>
-          <a:spcPct val="90000"/>
+          <a:spcPct val="85000"/>
         </a:lnSpc>
         <a:spcBef>
           <a:spcPct val="0"/>
         </a:spcBef>
         <a:buNone/>
-        <a:defRPr sz="4400" kern="1200">
+        <a:defRPr sz="5400" kern="1200" spc="-120" baseline="0">
           <a:solidFill>
-            <a:schemeClr val="tx1"/>
+            <a:schemeClr val="accent1"/>
           </a:solidFill>
           <a:latin typeface="+mj-lt"/>
           <a:ea typeface="+mj-ea"/>
@@ -3570,162 +3614,189 @@
       </a:lvl1pPr>
     </p:titleStyle>
     <p:bodyStyle>
-      <a:lvl1pPr marL="228600" indent="-228600" algn="l" defTabSz="914400" rtl="0" eaLnBrk="1" latinLnBrk="0" hangingPunct="1">
+      <a:lvl1pPr marL="91440" indent="-91440" algn="l" defTabSz="914400" rtl="0" eaLnBrk="1" latinLnBrk="0" hangingPunct="1">
         <a:lnSpc>
-          <a:spcPct val="90000"/>
+          <a:spcPct val="85000"/>
         </a:lnSpc>
         <a:spcBef>
-          <a:spcPts val="1000"/>
+          <a:spcPts val="1300"/>
         </a:spcBef>
-        <a:buFont typeface="Arial" panose="020B0604020202020204" pitchFamily="34" charset="0"/>
-        <a:buChar char="•"/>
-        <a:defRPr sz="2800" kern="1200">
+        <a:buFont typeface="Arial" pitchFamily="34" charset="0"/>
+        <a:buChar char=" "/>
+        <a:defRPr sz="2400" kern="1200">
           <a:solidFill>
-            <a:schemeClr val="tx1"/>
+            <a:schemeClr val="tx1">
+              <a:lumMod val="85000"/>
+              <a:lumOff val="15000"/>
+            </a:schemeClr>
           </a:solidFill>
           <a:latin typeface="+mn-lt"/>
           <a:ea typeface="+mn-ea"/>
           <a:cs typeface="+mn-cs"/>
         </a:defRPr>
       </a:lvl1pPr>
-      <a:lvl2pPr marL="685800" indent="-228600" algn="l" defTabSz="914400" rtl="0" eaLnBrk="1" latinLnBrk="0" hangingPunct="1">
+      <a:lvl2pPr marL="347472" indent="-342900" algn="l" defTabSz="914400" rtl="0" eaLnBrk="1" latinLnBrk="0" hangingPunct="1">
         <a:lnSpc>
-          <a:spcPct val="90000"/>
+          <a:spcPct val="85000"/>
         </a:lnSpc>
         <a:spcBef>
-          <a:spcPts val="500"/>
+          <a:spcPts val="600"/>
         </a:spcBef>
-        <a:buFont typeface="Arial" panose="020B0604020202020204" pitchFamily="34" charset="0"/>
-        <a:buChar char="•"/>
+        <a:buFont typeface="Arial" pitchFamily="34" charset="0"/>
+        <a:buChar char=" "/>
         <a:defRPr sz="2400" kern="1200">
           <a:solidFill>
-            <a:schemeClr val="tx1"/>
+            <a:schemeClr val="tx1">
+              <a:lumMod val="85000"/>
+              <a:lumOff val="15000"/>
+            </a:schemeClr>
           </a:solidFill>
           <a:latin typeface="+mn-lt"/>
           <a:ea typeface="+mn-ea"/>
           <a:cs typeface="+mn-cs"/>
         </a:defRPr>
       </a:lvl2pPr>
-      <a:lvl3pPr marL="1143000" indent="-228600" algn="l" defTabSz="914400" rtl="0" eaLnBrk="1" latinLnBrk="0" hangingPunct="1">
+      <a:lvl3pPr marL="548640" indent="-548640" algn="l" defTabSz="914400" rtl="0" eaLnBrk="1" latinLnBrk="0" hangingPunct="1">
         <a:lnSpc>
-          <a:spcPct val="90000"/>
+          <a:spcPct val="85000"/>
         </a:lnSpc>
         <a:spcBef>
-          <a:spcPts val="500"/>
+          <a:spcPts val="600"/>
         </a:spcBef>
-        <a:buFont typeface="Arial" panose="020B0604020202020204" pitchFamily="34" charset="0"/>
-        <a:buChar char="•"/>
-        <a:defRPr sz="2000" kern="1200">
+        <a:buFont typeface="Arial" pitchFamily="34" charset="0"/>
+        <a:buChar char=" "/>
+        <a:defRPr sz="2000" i="1" kern="1200">
           <a:solidFill>
-            <a:schemeClr val="tx1"/>
+            <a:schemeClr val="tx1">
+              <a:lumMod val="85000"/>
+              <a:lumOff val="15000"/>
+            </a:schemeClr>
           </a:solidFill>
           <a:latin typeface="+mn-lt"/>
           <a:ea typeface="+mn-ea"/>
           <a:cs typeface="+mn-cs"/>
         </a:defRPr>
       </a:lvl3pPr>
-      <a:lvl4pPr marL="1600200" indent="-228600" algn="l" defTabSz="914400" rtl="0" eaLnBrk="1" latinLnBrk="0" hangingPunct="1">
+      <a:lvl4pPr marL="822960" indent="-822960" algn="l" defTabSz="914400" rtl="0" eaLnBrk="1" latinLnBrk="0" hangingPunct="1">
         <a:lnSpc>
-          <a:spcPct val="90000"/>
+          <a:spcPct val="85000"/>
         </a:lnSpc>
         <a:spcBef>
-          <a:spcPts val="500"/>
+          <a:spcPts val="600"/>
         </a:spcBef>
-        <a:buFont typeface="Arial" panose="020B0604020202020204" pitchFamily="34" charset="0"/>
-        <a:buChar char="•"/>
+        <a:buFont typeface="Arial" pitchFamily="34" charset="0"/>
+        <a:buChar char=" "/>
         <a:defRPr sz="1800" kern="1200">
           <a:solidFill>
-            <a:schemeClr val="tx1"/>
+            <a:schemeClr val="tx1">
+              <a:lumMod val="85000"/>
+              <a:lumOff val="15000"/>
+            </a:schemeClr>
           </a:solidFill>
           <a:latin typeface="+mn-lt"/>
           <a:ea typeface="+mn-ea"/>
           <a:cs typeface="+mn-cs"/>
         </a:defRPr>
       </a:lvl4pPr>
-      <a:lvl5pPr marL="2057400" indent="-228600" algn="l" defTabSz="914400" rtl="0" eaLnBrk="1" latinLnBrk="0" hangingPunct="1">
+      <a:lvl5pPr marL="1097280" indent="-1097280" algn="l" defTabSz="914400" rtl="0" eaLnBrk="1" latinLnBrk="0" hangingPunct="1">
         <a:lnSpc>
-          <a:spcPct val="90000"/>
+          <a:spcPct val="85000"/>
         </a:lnSpc>
         <a:spcBef>
-          <a:spcPts val="500"/>
+          <a:spcPts val="600"/>
         </a:spcBef>
-        <a:buFont typeface="Arial" panose="020B0604020202020204" pitchFamily="34" charset="0"/>
-        <a:buChar char="•"/>
+        <a:buFont typeface="Arial" pitchFamily="34" charset="0"/>
+        <a:buChar char=" "/>
         <a:defRPr sz="1800" kern="1200">
           <a:solidFill>
-            <a:schemeClr val="tx1"/>
+            <a:schemeClr val="tx1">
+              <a:lumMod val="85000"/>
+              <a:lumOff val="15000"/>
+            </a:schemeClr>
           </a:solidFill>
           <a:latin typeface="+mn-lt"/>
           <a:ea typeface="+mn-ea"/>
           <a:cs typeface="+mn-cs"/>
         </a:defRPr>
       </a:lvl5pPr>
-      <a:lvl6pPr marL="2514600" indent="-228600" algn="l" defTabSz="914400" rtl="0" eaLnBrk="1" latinLnBrk="0" hangingPunct="1">
+      <a:lvl6pPr marL="1200000" indent="-228600" algn="l" defTabSz="914400" rtl="0" eaLnBrk="1" latinLnBrk="0" hangingPunct="1">
         <a:lnSpc>
-          <a:spcPct val="90000"/>
+          <a:spcPct val="85000"/>
         </a:lnSpc>
         <a:spcBef>
-          <a:spcPts val="500"/>
+          <a:spcPts val="600"/>
         </a:spcBef>
-        <a:buFont typeface="Arial" panose="020B0604020202020204" pitchFamily="34" charset="0"/>
-        <a:buChar char="•"/>
+        <a:buFont typeface="Arial" pitchFamily="34" charset="0"/>
+        <a:buChar char=" "/>
         <a:defRPr sz="1800" kern="1200">
           <a:solidFill>
-            <a:schemeClr val="tx1"/>
+            <a:schemeClr val="tx1">
+              <a:lumMod val="85000"/>
+              <a:lumOff val="15000"/>
+            </a:schemeClr>
           </a:solidFill>
           <a:latin typeface="+mn-lt"/>
           <a:ea typeface="+mn-ea"/>
           <a:cs typeface="+mn-cs"/>
         </a:defRPr>
       </a:lvl6pPr>
-      <a:lvl7pPr marL="2971800" indent="-228600" algn="l" defTabSz="914400" rtl="0" eaLnBrk="1" latinLnBrk="0" hangingPunct="1">
+      <a:lvl7pPr marL="1400000" indent="-228600" algn="l" defTabSz="914400" rtl="0" eaLnBrk="1" latinLnBrk="0" hangingPunct="1">
         <a:lnSpc>
-          <a:spcPct val="90000"/>
+          <a:spcPct val="85000"/>
         </a:lnSpc>
         <a:spcBef>
-          <a:spcPts val="500"/>
+          <a:spcPts val="600"/>
         </a:spcBef>
-        <a:buFont typeface="Arial" panose="020B0604020202020204" pitchFamily="34" charset="0"/>
-        <a:buChar char="•"/>
+        <a:buFont typeface="Arial" pitchFamily="34" charset="0"/>
+        <a:buChar char=" "/>
         <a:defRPr sz="1800" kern="1200">
           <a:solidFill>
-            <a:schemeClr val="tx1"/>
+            <a:schemeClr val="tx1">
+              <a:lumMod val="85000"/>
+              <a:lumOff val="15000"/>
+            </a:schemeClr>
           </a:solidFill>
           <a:latin typeface="+mn-lt"/>
           <a:ea typeface="+mn-ea"/>
           <a:cs typeface="+mn-cs"/>
         </a:defRPr>
       </a:lvl7pPr>
-      <a:lvl8pPr marL="3429000" indent="-228600" algn="l" defTabSz="914400" rtl="0" eaLnBrk="1" latinLnBrk="0" hangingPunct="1">
+      <a:lvl8pPr marL="1600000" indent="-228600" algn="l" defTabSz="914400" rtl="0" eaLnBrk="1" latinLnBrk="0" hangingPunct="1">
         <a:lnSpc>
-          <a:spcPct val="90000"/>
+          <a:spcPct val="85000"/>
         </a:lnSpc>
         <a:spcBef>
-          <a:spcPts val="500"/>
+          <a:spcPts val="600"/>
         </a:spcBef>
-        <a:buFont typeface="Arial" panose="020B0604020202020204" pitchFamily="34" charset="0"/>
-        <a:buChar char="•"/>
+        <a:buFont typeface="Arial" pitchFamily="34" charset="0"/>
+        <a:buChar char=" "/>
         <a:defRPr sz="1800" kern="1200">
           <a:solidFill>
-            <a:schemeClr val="tx1"/>
+            <a:schemeClr val="tx1">
+              <a:lumMod val="85000"/>
+              <a:lumOff val="15000"/>
+            </a:schemeClr>
           </a:solidFill>
           <a:latin typeface="+mn-lt"/>
           <a:ea typeface="+mn-ea"/>
           <a:cs typeface="+mn-cs"/>
         </a:defRPr>
       </a:lvl8pPr>
-      <a:lvl9pPr marL="3886200" indent="-228600" algn="l" defTabSz="914400" rtl="0" eaLnBrk="1" latinLnBrk="0" hangingPunct="1">
+      <a:lvl9pPr marL="1800000" indent="-228600" algn="l" defTabSz="914400" rtl="0" eaLnBrk="1" latinLnBrk="0" hangingPunct="1">
         <a:lnSpc>
-          <a:spcPct val="90000"/>
+          <a:spcPct val="85000"/>
         </a:lnSpc>
         <a:spcBef>
-          <a:spcPts val="500"/>
+          <a:spcPts val="600"/>
         </a:spcBef>
-        <a:buFont typeface="Arial" panose="020B0604020202020204" pitchFamily="34" charset="0"/>
-        <a:buChar char="•"/>
+        <a:buFont typeface="Arial" pitchFamily="34" charset="0"/>
+        <a:buChar char=" "/>
         <a:defRPr sz="1800" kern="1200">
           <a:solidFill>
-            <a:schemeClr val="tx1"/>
+            <a:schemeClr val="tx1">
+              <a:lumMod val="85000"/>
+              <a:lumOff val="15000"/>
+            </a:schemeClr>
           </a:solidFill>
           <a:latin typeface="+mn-lt"/>
           <a:ea typeface="+mn-ea"/>
@@ -3862,7 +3933,7 @@
             <a:spLocks noGrp="1"/>
           </p:cNvSpPr>
           <p:nvPr>
-            <p:ph type="title"/>
+            <p:ph type="ctrTitle"/>
           </p:nvPr>
         </p:nvSpPr>
         <p:spPr/>
@@ -3890,15 +3961,18 @@
             <a:spLocks noGrp="1"/>
           </p:cNvSpPr>
           <p:nvPr>
-            <p:ph type="body" idx="1"/>
-          </p:nvPr>
-        </p:nvSpPr>
-        <p:spPr/>
-        <p:txBody>
-          <a:bodyPr/>
-          <a:lstStyle/>
-          <a:p>
-            <a:endParaRPr lang="en-US"/>
+            <p:ph type="subTitle" idx="1"/>
+          </p:nvPr>
+        </p:nvSpPr>
+        <p:spPr/>
+        <p:txBody>
+          <a:bodyPr/>
+          <a:lstStyle/>
+          <a:p>
+            <a:r>
+              <a:rPr lang="en-US" dirty="0"/>
+              <a:t>AI4ALL NLP Group</a:t>
+            </a:r>
           </a:p>
         </p:txBody>
       </p:sp>
@@ -3934,10 +4008,10 @@
       </p:grpSpPr>
       <p:sp>
         <p:nvSpPr>
-          <p:cNvPr id="2" name="Title 1">
+          <p:cNvPr id="4" name="Title 3">
             <a:extLst>
               <a:ext uri="{FF2B5EF4-FFF2-40B4-BE49-F238E27FC236}">
-                <a16:creationId xmlns:a16="http://schemas.microsoft.com/office/drawing/2014/main" id="{D0F2D0D4-5300-45E4-99D3-2BC5CC3876AC}"/>
+                <a16:creationId xmlns:a16="http://schemas.microsoft.com/office/drawing/2014/main" id="{C365DFB1-2E4E-4DB3-9E27-93A3915A58B7}"/>
               </a:ext>
             </a:extLst>
           </p:cNvPr>
@@ -3950,24 +4024,22 @@
         </p:nvSpPr>
         <p:spPr/>
         <p:txBody>
-          <a:bodyPr>
-            <a:normAutofit/>
-          </a:bodyPr>
+          <a:bodyPr/>
           <a:lstStyle/>
           <a:p>
             <a:r>
               <a:rPr lang="en-US" dirty="0"/>
-              <a:t>Why might word-based rules not work with FNC? What other rules can you think of?</a:t>
-            </a:r>
-          </a:p>
-        </p:txBody>
-      </p:sp>
-      <p:sp>
-        <p:nvSpPr>
-          <p:cNvPr id="3" name="Content Placeholder 2">
+              <a:t>Quick Review</a:t>
+            </a:r>
+          </a:p>
+        </p:txBody>
+      </p:sp>
+      <p:sp>
+        <p:nvSpPr>
+          <p:cNvPr id="5" name="Text Placeholder 4">
             <a:extLst>
               <a:ext uri="{FF2B5EF4-FFF2-40B4-BE49-F238E27FC236}">
-                <a16:creationId xmlns:a16="http://schemas.microsoft.com/office/drawing/2014/main" id="{DB42368F-45E3-4DF7-BA36-475860048254}"/>
+                <a16:creationId xmlns:a16="http://schemas.microsoft.com/office/drawing/2014/main" id="{DD6632D6-1B8F-429B-8A90-CC4C558959F4}"/>
               </a:ext>
             </a:extLst>
           </p:cNvPr>
@@ -3975,35 +4047,22 @@
             <a:spLocks noGrp="1"/>
           </p:cNvSpPr>
           <p:nvPr>
-            <p:ph idx="1"/>
-          </p:nvPr>
-        </p:nvSpPr>
-        <p:spPr>
-          <a:xfrm>
-            <a:off x="2387111" y="2766218"/>
-            <a:ext cx="7417777" cy="1325563"/>
-          </a:xfrm>
-        </p:spPr>
-        <p:txBody>
-          <a:bodyPr>
-            <a:normAutofit/>
-          </a:bodyPr>
-          <a:lstStyle/>
-          <a:p>
-            <a:pPr marL="0" indent="0">
-              <a:buNone/>
-            </a:pPr>
-            <a:r>
-              <a:rPr lang="en-US" sz="4500" b="1" dirty="0"/>
-              <a:t>Discuss with your neighbors</a:t>
-            </a:r>
+            <p:ph type="body" idx="1"/>
+          </p:nvPr>
+        </p:nvSpPr>
+        <p:spPr/>
+        <p:txBody>
+          <a:bodyPr/>
+          <a:lstStyle/>
+          <a:p>
+            <a:endParaRPr lang="en-US" dirty="0"/>
           </a:p>
         </p:txBody>
       </p:sp>
     </p:spTree>
     <p:extLst>
       <p:ext uri="{BB962C8B-B14F-4D97-AF65-F5344CB8AC3E}">
-        <p14:creationId xmlns:p14="http://schemas.microsoft.com/office/powerpoint/2010/main" val="1249028208"/>
+        <p14:creationId xmlns:p14="http://schemas.microsoft.com/office/powerpoint/2010/main" val="1884019543"/>
       </p:ext>
     </p:extLst>
   </p:cSld>
@@ -4032,6 +4091,273 @@
       </p:grpSpPr>
       <p:sp>
         <p:nvSpPr>
+          <p:cNvPr id="7" name="Content Placeholder 6">
+            <a:extLst>
+              <a:ext uri="{FF2B5EF4-FFF2-40B4-BE49-F238E27FC236}">
+                <a16:creationId xmlns:a16="http://schemas.microsoft.com/office/drawing/2014/main" id="{E7C59183-52F6-424D-BFBA-A20C99F8A3F4}"/>
+              </a:ext>
+            </a:extLst>
+          </p:cNvPr>
+          <p:cNvSpPr>
+            <a:spLocks noGrp="1"/>
+          </p:cNvSpPr>
+          <p:nvPr>
+            <p:ph idx="1"/>
+          </p:nvPr>
+        </p:nvSpPr>
+        <p:spPr/>
+        <p:txBody>
+          <a:bodyPr>
+            <a:normAutofit/>
+          </a:bodyPr>
+          <a:lstStyle/>
+          <a:p>
+            <a:pPr lvl="1">
+              <a:buFont typeface="Wingdings" panose="05000000000000000000" pitchFamily="2" charset="2"/>
+              <a:buChar char="§"/>
+            </a:pPr>
+            <a:r>
+              <a:rPr lang="en-US" sz="4400" dirty="0" err="1"/>
+              <a:t>Jupyter</a:t>
+            </a:r>
+            <a:r>
+              <a:rPr lang="en-US" sz="4400" dirty="0"/>
+              <a:t> Notebook: Code vs Markdown cells</a:t>
+            </a:r>
+          </a:p>
+          <a:p>
+            <a:pPr lvl="1">
+              <a:buFont typeface="Wingdings" panose="05000000000000000000" pitchFamily="2" charset="2"/>
+              <a:buChar char="§"/>
+            </a:pPr>
+            <a:r>
+              <a:rPr lang="en-US" sz="4400" dirty="0" err="1"/>
+              <a:t>Histographs</a:t>
+            </a:r>
+            <a:endParaRPr lang="en-US" sz="4400" dirty="0"/>
+          </a:p>
+          <a:p>
+            <a:pPr lvl="1">
+              <a:buFont typeface="Wingdings" panose="05000000000000000000" pitchFamily="2" charset="2"/>
+              <a:buChar char="§"/>
+            </a:pPr>
+            <a:r>
+              <a:rPr lang="en-US" sz="4400" dirty="0"/>
+              <a:t>Logic behind machine learning</a:t>
+            </a:r>
+          </a:p>
+          <a:p>
+            <a:pPr lvl="1">
+              <a:buFont typeface="Wingdings" panose="05000000000000000000" pitchFamily="2" charset="2"/>
+              <a:buChar char="§"/>
+            </a:pPr>
+            <a:r>
+              <a:rPr lang="en-US" sz="4400" dirty="0"/>
+              <a:t>Our spam email filter</a:t>
+            </a:r>
+          </a:p>
+          <a:p>
+            <a:pPr lvl="1">
+              <a:buFont typeface="Wingdings" panose="05000000000000000000" pitchFamily="2" charset="2"/>
+              <a:buChar char="§"/>
+            </a:pPr>
+            <a:r>
+              <a:rPr lang="en-US" sz="4400" dirty="0"/>
+              <a:t>Recap of the FNC dataset</a:t>
+            </a:r>
+          </a:p>
+        </p:txBody>
+      </p:sp>
+    </p:spTree>
+    <p:extLst>
+      <p:ext uri="{BB962C8B-B14F-4D97-AF65-F5344CB8AC3E}">
+        <p14:creationId xmlns:p14="http://schemas.microsoft.com/office/powerpoint/2010/main" val="2649997004"/>
+      </p:ext>
+    </p:extLst>
+  </p:cSld>
+  <p:clrMapOvr>
+    <a:masterClrMapping/>
+  </p:clrMapOvr>
+</p:sld>
+</file>
+
+<file path=ppt/slides/slide4.xml><?xml version="1.0" encoding="utf-8"?>
+<p:sld xmlns:a="http://schemas.openxmlformats.org/drawingml/2006/main" xmlns:r="http://schemas.openxmlformats.org/officeDocument/2006/relationships" xmlns:p="http://schemas.openxmlformats.org/presentationml/2006/main">
+  <p:cSld>
+    <p:spTree>
+      <p:nvGrpSpPr>
+        <p:cNvPr id="1" name=""/>
+        <p:cNvGrpSpPr/>
+        <p:nvPr/>
+      </p:nvGrpSpPr>
+      <p:grpSpPr>
+        <a:xfrm>
+          <a:off x="0" y="0"/>
+          <a:ext cx="0" cy="0"/>
+          <a:chOff x="0" y="0"/>
+          <a:chExt cx="0" cy="0"/>
+        </a:xfrm>
+      </p:grpSpPr>
+      <p:sp>
+        <p:nvSpPr>
+          <p:cNvPr id="4" name="Title 3">
+            <a:extLst>
+              <a:ext uri="{FF2B5EF4-FFF2-40B4-BE49-F238E27FC236}">
+                <a16:creationId xmlns:a16="http://schemas.microsoft.com/office/drawing/2014/main" id="{C365DFB1-2E4E-4DB3-9E27-93A3915A58B7}"/>
+              </a:ext>
+            </a:extLst>
+          </p:cNvPr>
+          <p:cNvSpPr>
+            <a:spLocks noGrp="1"/>
+          </p:cNvSpPr>
+          <p:nvPr>
+            <p:ph type="title"/>
+          </p:nvPr>
+        </p:nvSpPr>
+        <p:spPr/>
+        <p:txBody>
+          <a:bodyPr/>
+          <a:lstStyle/>
+          <a:p>
+            <a:r>
+              <a:rPr lang="en-US" dirty="0"/>
+              <a:t>Rule-Based Approaches with FNC</a:t>
+            </a:r>
+          </a:p>
+        </p:txBody>
+      </p:sp>
+      <p:sp>
+        <p:nvSpPr>
+          <p:cNvPr id="5" name="Text Placeholder 4">
+            <a:extLst>
+              <a:ext uri="{FF2B5EF4-FFF2-40B4-BE49-F238E27FC236}">
+                <a16:creationId xmlns:a16="http://schemas.microsoft.com/office/drawing/2014/main" id="{DD6632D6-1B8F-429B-8A90-CC4C558959F4}"/>
+              </a:ext>
+            </a:extLst>
+          </p:cNvPr>
+          <p:cNvSpPr>
+            <a:spLocks noGrp="1"/>
+          </p:cNvSpPr>
+          <p:nvPr>
+            <p:ph type="body" idx="1"/>
+          </p:nvPr>
+        </p:nvSpPr>
+        <p:spPr/>
+        <p:txBody>
+          <a:bodyPr/>
+          <a:lstStyle/>
+          <a:p>
+            <a:endParaRPr lang="en-US" dirty="0"/>
+          </a:p>
+        </p:txBody>
+      </p:sp>
+    </p:spTree>
+    <p:extLst>
+      <p:ext uri="{BB962C8B-B14F-4D97-AF65-F5344CB8AC3E}">
+        <p14:creationId xmlns:p14="http://schemas.microsoft.com/office/powerpoint/2010/main" val="1689334726"/>
+      </p:ext>
+    </p:extLst>
+  </p:cSld>
+  <p:clrMapOvr>
+    <a:masterClrMapping/>
+  </p:clrMapOvr>
+</p:sld>
+</file>
+
+<file path=ppt/slides/slide5.xml><?xml version="1.0" encoding="utf-8"?>
+<p:sld xmlns:a="http://schemas.openxmlformats.org/drawingml/2006/main" xmlns:r="http://schemas.openxmlformats.org/officeDocument/2006/relationships" xmlns:p="http://schemas.openxmlformats.org/presentationml/2006/main">
+  <p:cSld>
+    <p:spTree>
+      <p:nvGrpSpPr>
+        <p:cNvPr id="1" name=""/>
+        <p:cNvGrpSpPr/>
+        <p:nvPr/>
+      </p:nvGrpSpPr>
+      <p:grpSpPr>
+        <a:xfrm>
+          <a:off x="0" y="0"/>
+          <a:ext cx="0" cy="0"/>
+          <a:chOff x="0" y="0"/>
+          <a:chExt cx="0" cy="0"/>
+        </a:xfrm>
+      </p:grpSpPr>
+      <p:sp>
+        <p:nvSpPr>
+          <p:cNvPr id="2" name="Title 1">
+            <a:extLst>
+              <a:ext uri="{FF2B5EF4-FFF2-40B4-BE49-F238E27FC236}">
+                <a16:creationId xmlns:a16="http://schemas.microsoft.com/office/drawing/2014/main" id="{D0F2D0D4-5300-45E4-99D3-2BC5CC3876AC}"/>
+              </a:ext>
+            </a:extLst>
+          </p:cNvPr>
+          <p:cNvSpPr>
+            <a:spLocks noGrp="1"/>
+          </p:cNvSpPr>
+          <p:nvPr>
+            <p:ph type="title"/>
+          </p:nvPr>
+        </p:nvSpPr>
+        <p:spPr>
+          <a:xfrm>
+            <a:off x="709612" y="2599901"/>
+            <a:ext cx="10772775" cy="1658198"/>
+          </a:xfrm>
+        </p:spPr>
+        <p:txBody>
+          <a:bodyPr>
+            <a:normAutofit fontScale="90000"/>
+          </a:bodyPr>
+          <a:lstStyle/>
+          <a:p>
+            <a:r>
+              <a:rPr lang="en-US" dirty="0"/>
+              <a:t>What are some ways we can use rule-based approaches to FNC?</a:t>
+            </a:r>
+            <a:br>
+              <a:rPr lang="en-US" dirty="0"/>
+            </a:br>
+            <a:br>
+              <a:rPr lang="en-US" dirty="0"/>
+            </a:br>
+            <a:r>
+              <a:rPr lang="en-US" dirty="0"/>
+              <a:t>How well do you think this will work?</a:t>
+            </a:r>
+          </a:p>
+        </p:txBody>
+      </p:sp>
+    </p:spTree>
+    <p:extLst>
+      <p:ext uri="{BB962C8B-B14F-4D97-AF65-F5344CB8AC3E}">
+        <p14:creationId xmlns:p14="http://schemas.microsoft.com/office/powerpoint/2010/main" val="1249028208"/>
+      </p:ext>
+    </p:extLst>
+  </p:cSld>
+  <p:clrMapOvr>
+    <a:masterClrMapping/>
+  </p:clrMapOvr>
+</p:sld>
+</file>
+
+<file path=ppt/slides/slide6.xml><?xml version="1.0" encoding="utf-8"?>
+<p:sld xmlns:a="http://schemas.openxmlformats.org/drawingml/2006/main" xmlns:r="http://schemas.openxmlformats.org/officeDocument/2006/relationships" xmlns:p="http://schemas.openxmlformats.org/presentationml/2006/main">
+  <p:cSld>
+    <p:spTree>
+      <p:nvGrpSpPr>
+        <p:cNvPr id="1" name=""/>
+        <p:cNvGrpSpPr/>
+        <p:nvPr/>
+      </p:nvGrpSpPr>
+      <p:grpSpPr>
+        <a:xfrm>
+          <a:off x="0" y="0"/>
+          <a:ext cx="0" cy="0"/>
+          <a:chOff x="0" y="0"/>
+          <a:chExt cx="0" cy="0"/>
+        </a:xfrm>
+      </p:grpSpPr>
+      <p:sp>
+        <p:nvSpPr>
           <p:cNvPr id="4" name="Title 3">
             <a:extLst>
               <a:ext uri="{FF2B5EF4-FFF2-40B4-BE49-F238E27FC236}">
@@ -4071,10 +4397,138 @@
 </p:sld>
 </file>
 
+<file path=ppt/slides/slide7.xml><?xml version="1.0" encoding="utf-8"?>
+<p:sld xmlns:a="http://schemas.openxmlformats.org/drawingml/2006/main" xmlns:r="http://schemas.openxmlformats.org/officeDocument/2006/relationships" xmlns:p="http://schemas.openxmlformats.org/presentationml/2006/main">
+  <p:cSld>
+    <p:spTree>
+      <p:nvGrpSpPr>
+        <p:cNvPr id="1" name=""/>
+        <p:cNvGrpSpPr/>
+        <p:nvPr/>
+      </p:nvGrpSpPr>
+      <p:grpSpPr>
+        <a:xfrm>
+          <a:off x="0" y="0"/>
+          <a:ext cx="0" cy="0"/>
+          <a:chOff x="0" y="0"/>
+          <a:chExt cx="0" cy="0"/>
+        </a:xfrm>
+      </p:grpSpPr>
+      <p:sp>
+        <p:nvSpPr>
+          <p:cNvPr id="5" name="Content Placeholder 4">
+            <a:extLst>
+              <a:ext uri="{FF2B5EF4-FFF2-40B4-BE49-F238E27FC236}">
+                <a16:creationId xmlns:a16="http://schemas.microsoft.com/office/drawing/2014/main" id="{11DA8C16-B00E-40E9-A70D-DC126F9E6D3F}"/>
+              </a:ext>
+            </a:extLst>
+          </p:cNvPr>
+          <p:cNvSpPr>
+            <a:spLocks noGrp="1"/>
+          </p:cNvSpPr>
+          <p:nvPr>
+            <p:ph idx="1"/>
+          </p:nvPr>
+        </p:nvSpPr>
+        <p:spPr>
+          <a:xfrm>
+            <a:off x="719137" y="1545907"/>
+            <a:ext cx="10753725" cy="3766185"/>
+          </a:xfrm>
+        </p:spPr>
+        <p:txBody>
+          <a:bodyPr>
+            <a:normAutofit fontScale="70000" lnSpcReduction="20000"/>
+          </a:bodyPr>
+          <a:lstStyle/>
+          <a:p>
+            <a:pPr algn="ctr"/>
+            <a:r>
+              <a:rPr lang="en-US" sz="7200" dirty="0"/>
+              <a:t>bit.ly/2uPRcmq</a:t>
+            </a:r>
+          </a:p>
+          <a:p>
+            <a:pPr algn="ctr"/>
+            <a:endParaRPr lang="en-US" sz="7200" dirty="0"/>
+          </a:p>
+          <a:p>
+            <a:pPr algn="ctr"/>
+            <a:r>
+              <a:rPr lang="en-US" sz="7700" dirty="0"/>
+              <a:t>Reminders:</a:t>
+            </a:r>
+            <a:endParaRPr lang="en-US" sz="7000" dirty="0"/>
+          </a:p>
+          <a:p>
+            <a:pPr lvl="1">
+              <a:buFont typeface="Wingdings" panose="05000000000000000000" pitchFamily="2" charset="2"/>
+              <a:buChar char="§"/>
+            </a:pPr>
+            <a:r>
+              <a:rPr lang="en-US" sz="4400" dirty="0"/>
+              <a:t>Optional office hours today from 4:30-5:30pm above Wu</a:t>
+            </a:r>
+          </a:p>
+          <a:p>
+            <a:pPr lvl="1">
+              <a:buFont typeface="Wingdings" panose="05000000000000000000" pitchFamily="2" charset="2"/>
+              <a:buChar char="§"/>
+            </a:pPr>
+            <a:r>
+              <a:rPr lang="en-US" sz="4400" dirty="0"/>
+              <a:t>Email with questions (</a:t>
+            </a:r>
+            <a:r>
+              <a:rPr lang="en-US" sz="4800" b="1" dirty="0"/>
+              <a:t>cc27@alumni.princeton.edu , mhamin@princeton.edu</a:t>
+            </a:r>
+            <a:r>
+              <a:rPr lang="en-US" sz="4800" dirty="0"/>
+              <a:t>)</a:t>
+            </a:r>
+          </a:p>
+          <a:p>
+            <a:pPr lvl="1">
+              <a:buFont typeface="Wingdings" panose="05000000000000000000" pitchFamily="2" charset="2"/>
+              <a:buChar char="§"/>
+            </a:pPr>
+            <a:r>
+              <a:rPr lang="en-US" sz="4800" dirty="0"/>
+              <a:t>Have a good weekend and take a break!</a:t>
+            </a:r>
+          </a:p>
+          <a:p>
+            <a:pPr marL="0" indent="0">
+              <a:buNone/>
+            </a:pPr>
+            <a:endParaRPr lang="en-US" sz="4800" dirty="0"/>
+          </a:p>
+          <a:p>
+            <a:pPr marL="0" indent="0">
+              <a:buNone/>
+            </a:pPr>
+            <a:endParaRPr lang="en-US" sz="4800" dirty="0"/>
+          </a:p>
+        </p:txBody>
+      </p:sp>
+    </p:spTree>
+    <p:extLst>
+      <p:ext uri="{BB962C8B-B14F-4D97-AF65-F5344CB8AC3E}">
+        <p14:creationId xmlns:p14="http://schemas.microsoft.com/office/powerpoint/2010/main" val="1996125105"/>
+      </p:ext>
+    </p:extLst>
+  </p:cSld>
+  <p:clrMapOvr>
+    <a:masterClrMapping/>
+  </p:clrMapOvr>
+</p:sld>
+</file>
+
 <file path=ppt/theme/theme1.xml><?xml version="1.0" encoding="utf-8"?>
-<a:theme xmlns:a="http://schemas.openxmlformats.org/drawingml/2006/main" name="Office Theme">
+<a:theme xmlns:a="http://schemas.openxmlformats.org/drawingml/2006/main" name="Metropolitan">
   <a:themeElements>
-    <a:clrScheme name="Office">
+    <a:clrScheme name="Metropolitan">
       <a:dk1>
         <a:sysClr val="windowText" lastClr="000000"/>
       </a:dk1>
@@ -4082,44 +4536,44 @@
         <a:sysClr val="window" lastClr="FFFFFF"/>
       </a:lt1>
       <a:dk2>
-        <a:srgbClr val="44546A"/>
+        <a:srgbClr val="162F33"/>
       </a:dk2>
       <a:lt2>
-        <a:srgbClr val="E7E6E6"/>
+        <a:srgbClr val="EAF0E0"/>
       </a:lt2>
       <a:accent1>
-        <a:srgbClr val="4472C4"/>
+        <a:srgbClr val="50B4C8"/>
       </a:accent1>
       <a:accent2>
-        <a:srgbClr val="ED7D31"/>
+        <a:srgbClr val="A8B97F"/>
       </a:accent2>
       <a:accent3>
-        <a:srgbClr val="A5A5A5"/>
+        <a:srgbClr val="9B9256"/>
       </a:accent3>
       <a:accent4>
-        <a:srgbClr val="FFC000"/>
+        <a:srgbClr val="657689"/>
       </a:accent4>
       <a:accent5>
-        <a:srgbClr val="5B9BD5"/>
+        <a:srgbClr val="7A855D"/>
       </a:accent5>
       <a:accent6>
-        <a:srgbClr val="70AD47"/>
+        <a:srgbClr val="84AC9D"/>
       </a:accent6>
       <a:hlink>
-        <a:srgbClr val="0563C1"/>
+        <a:srgbClr val="2370CD"/>
       </a:hlink>
       <a:folHlink>
-        <a:srgbClr val="954F72"/>
+        <a:srgbClr val="877589"/>
       </a:folHlink>
     </a:clrScheme>
-    <a:fontScheme name="Office">
+    <a:fontScheme name="Metropolitan">
       <a:majorFont>
         <a:latin typeface="Calibri Light" panose="020F0302020204030204"/>
         <a:ea typeface=""/>
         <a:cs typeface=""/>
-        <a:font script="Jpan" typeface="游ゴシック Light"/>
+        <a:font script="Jpan" typeface="ＭＳ Ｐゴシック"/>
         <a:font script="Hang" typeface="맑은 고딕"/>
-        <a:font script="Hans" typeface="等线 Light"/>
+        <a:font script="Hans" typeface="宋体"/>
         <a:font script="Hant" typeface="新細明體"/>
         <a:font script="Arab" typeface="Times New Roman"/>
         <a:font script="Hebr" typeface="Times New Roman"/>
@@ -4147,39 +4601,22 @@
         <a:font script="Viet" typeface="Times New Roman"/>
         <a:font script="Uigh" typeface="Microsoft Uighur"/>
         <a:font script="Geor" typeface="Sylfaen"/>
-        <a:font script="Armn" typeface="Arial"/>
-        <a:font script="Bugi" typeface="Leelawadee UI"/>
-        <a:font script="Bopo" typeface="Microsoft JhengHei"/>
-        <a:font script="Java" typeface="Javanese Text"/>
-        <a:font script="Lisu" typeface="Segoe UI"/>
-        <a:font script="Mymr" typeface="Myanmar Text"/>
-        <a:font script="Nkoo" typeface="Ebrima"/>
-        <a:font script="Olck" typeface="Nirmala UI"/>
-        <a:font script="Osma" typeface="Ebrima"/>
-        <a:font script="Phag" typeface="Phagspa"/>
-        <a:font script="Syrn" typeface="Estrangelo Edessa"/>
-        <a:font script="Syrj" typeface="Estrangelo Edessa"/>
-        <a:font script="Syre" typeface="Estrangelo Edessa"/>
-        <a:font script="Sora" typeface="Nirmala UI"/>
-        <a:font script="Tale" typeface="Microsoft Tai Le"/>
-        <a:font script="Talu" typeface="Microsoft New Tai Lue"/>
-        <a:font script="Tfng" typeface="Ebrima"/>
       </a:majorFont>
       <a:minorFont>
-        <a:latin typeface="Calibri" panose="020F0502020204030204"/>
+        <a:latin typeface="Calibri Light" panose="020F0302020204030204"/>
         <a:ea typeface=""/>
         <a:cs typeface=""/>
-        <a:font script="Jpan" typeface="游ゴシック"/>
+        <a:font script="Jpan" typeface="ＭＳ Ｐゴシック"/>
         <a:font script="Hang" typeface="맑은 고딕"/>
-        <a:font script="Hans" typeface="等线"/>
+        <a:font script="Hans" typeface="宋体"/>
         <a:font script="Hant" typeface="新細明體"/>
-        <a:font script="Arab" typeface="Arial"/>
-        <a:font script="Hebr" typeface="Arial"/>
-        <a:font script="Thai" typeface="Cordia New"/>
+        <a:font script="Arab" typeface="Times New Roman"/>
+        <a:font script="Hebr" typeface="Times New Roman"/>
+        <a:font script="Thai" typeface="Angsana New"/>
         <a:font script="Ethi" typeface="Nyala"/>
         <a:font script="Beng" typeface="Vrinda"/>
         <a:font script="Gujr" typeface="Shruti"/>
-        <a:font script="Khmr" typeface="DaunPenh"/>
+        <a:font script="Khmr" typeface="MoolBoran"/>
         <a:font script="Knda" typeface="Tunga"/>
         <a:font script="Guru" typeface="Raavi"/>
         <a:font script="Cans" typeface="Euphemia"/>
@@ -4196,29 +4633,12 @@
         <a:font script="Laoo" typeface="DokChampa"/>
         <a:font script="Sinh" typeface="Iskoola Pota"/>
         <a:font script="Mong" typeface="Mongolian Baiti"/>
-        <a:font script="Viet" typeface="Arial"/>
+        <a:font script="Viet" typeface="Times New Roman"/>
         <a:font script="Uigh" typeface="Microsoft Uighur"/>
         <a:font script="Geor" typeface="Sylfaen"/>
-        <a:font script="Armn" typeface="Arial"/>
-        <a:font script="Bugi" typeface="Leelawadee UI"/>
-        <a:font script="Bopo" typeface="Microsoft JhengHei"/>
-        <a:font script="Java" typeface="Javanese Text"/>
-        <a:font script="Lisu" typeface="Segoe UI"/>
-        <a:font script="Mymr" typeface="Myanmar Text"/>
-        <a:font script="Nkoo" typeface="Ebrima"/>
-        <a:font script="Olck" typeface="Nirmala UI"/>
-        <a:font script="Osma" typeface="Ebrima"/>
-        <a:font script="Phag" typeface="Phagspa"/>
-        <a:font script="Syrn" typeface="Estrangelo Edessa"/>
-        <a:font script="Syrj" typeface="Estrangelo Edessa"/>
-        <a:font script="Syre" typeface="Estrangelo Edessa"/>
-        <a:font script="Sora" typeface="Nirmala UI"/>
-        <a:font script="Tale" typeface="Microsoft Tai Le"/>
-        <a:font script="Talu" typeface="Microsoft New Tai Lue"/>
-        <a:font script="Tfng" typeface="Ebrima"/>
       </a:minorFont>
     </a:fontScheme>
-    <a:fmtScheme name="Office">
+    <a:fmtScheme name="Metropolitan">
       <a:fillStyleLst>
         <a:solidFill>
           <a:schemeClr val="phClr"/>
@@ -4227,76 +4647,73 @@
           <a:gsLst>
             <a:gs pos="0">
               <a:schemeClr val="phClr">
+                <a:tint val="70000"/>
+                <a:satMod val="100000"/>
                 <a:lumMod val="110000"/>
-                <a:satMod val="105000"/>
-                <a:tint val="67000"/>
               </a:schemeClr>
             </a:gs>
             <a:gs pos="50000">
               <a:schemeClr val="phClr">
+                <a:tint val="75000"/>
+                <a:satMod val="101000"/>
                 <a:lumMod val="105000"/>
-                <a:satMod val="103000"/>
-                <a:tint val="73000"/>
               </a:schemeClr>
             </a:gs>
             <a:gs pos="100000">
               <a:schemeClr val="phClr">
+                <a:tint val="82000"/>
+                <a:satMod val="104000"/>
                 <a:lumMod val="105000"/>
-                <a:satMod val="109000"/>
-                <a:tint val="81000"/>
               </a:schemeClr>
             </a:gs>
           </a:gsLst>
-          <a:lin ang="5400000" scaled="0"/>
+          <a:lin ang="2700000" scaled="0"/>
         </a:gradFill>
         <a:gradFill rotWithShape="1">
           <a:gsLst>
             <a:gs pos="0">
               <a:schemeClr val="phClr">
-                <a:satMod val="103000"/>
+                <a:tint val="97000"/>
+                <a:satMod val="100000"/>
                 <a:lumMod val="102000"/>
-                <a:tint val="94000"/>
               </a:schemeClr>
             </a:gs>
             <a:gs pos="50000">
               <a:schemeClr val="phClr">
-                <a:satMod val="110000"/>
+                <a:shade val="100000"/>
+                <a:satMod val="100000"/>
                 <a:lumMod val="100000"/>
-                <a:shade val="100000"/>
               </a:schemeClr>
             </a:gs>
             <a:gs pos="100000">
               <a:schemeClr val="phClr">
+                <a:shade val="80000"/>
+                <a:satMod val="100000"/>
                 <a:lumMod val="99000"/>
-                <a:satMod val="120000"/>
-                <a:shade val="78000"/>
               </a:schemeClr>
             </a:gs>
           </a:gsLst>
-          <a:lin ang="5400000" scaled="0"/>
+          <a:lin ang="2700000" scaled="0"/>
         </a:gradFill>
       </a:fillStyleLst>
       <a:lnStyleLst>
-        <a:ln w="6350" cap="flat" cmpd="sng" algn="ctr">
+        <a:ln w="9525" cap="flat" cmpd="sng" algn="ctr">
           <a:solidFill>
             <a:schemeClr val="phClr"/>
           </a:solidFill>
           <a:prstDash val="solid"/>
-          <a:miter lim="800000"/>
         </a:ln>
         <a:ln w="12700" cap="flat" cmpd="sng" algn="ctr">
           <a:solidFill>
             <a:schemeClr val="phClr"/>
           </a:solidFill>
           <a:prstDash val="solid"/>
-          <a:miter lim="800000"/>
         </a:ln>
         <a:ln w="19050" cap="flat" cmpd="sng" algn="ctr">
           <a:solidFill>
             <a:schemeClr val="phClr"/>
           </a:solidFill>
           <a:prstDash val="solid"/>
-          <a:miter lim="800000"/>
         </a:ln>
       </a:lnStyleLst>
       <a:effectStyleLst>
@@ -4326,33 +4743,12 @@
             <a:satMod val="170000"/>
           </a:schemeClr>
         </a:solidFill>
-        <a:gradFill rotWithShape="1">
-          <a:gsLst>
-            <a:gs pos="0">
-              <a:schemeClr val="phClr">
-                <a:tint val="93000"/>
-                <a:satMod val="150000"/>
-                <a:shade val="98000"/>
-                <a:lumMod val="102000"/>
-              </a:schemeClr>
-            </a:gs>
-            <a:gs pos="50000">
-              <a:schemeClr val="phClr">
-                <a:tint val="98000"/>
-                <a:satMod val="130000"/>
-                <a:shade val="90000"/>
-                <a:lumMod val="103000"/>
-              </a:schemeClr>
-            </a:gs>
-            <a:gs pos="100000">
-              <a:schemeClr val="phClr">
-                <a:shade val="63000"/>
-                <a:satMod val="120000"/>
-              </a:schemeClr>
-            </a:gs>
-          </a:gsLst>
-          <a:lin ang="5400000" scaled="0"/>
-        </a:gradFill>
+        <a:solidFill>
+          <a:schemeClr val="phClr">
+            <a:shade val="95000"/>
+            <a:satMod val="170000"/>
+          </a:schemeClr>
+        </a:solidFill>
       </a:bgFillStyleLst>
     </a:fmtScheme>
   </a:themeElements>
@@ -4360,7 +4756,7 @@
   <a:extraClrSchemeLst/>
   <a:extLst>
     <a:ext uri="{05A4C25C-085E-4340-85A3-A5531E510DB2}">
-      <thm15:themeFamily xmlns:thm15="http://schemas.microsoft.com/office/thememl/2012/main" name="Office Theme" id="{62F939B6-93AF-4DB8-9C6B-D6C7DFDC589F}" vid="{4A3C46E8-61CC-4603-A589-7422A47A8E4A}"/>
+      <thm15:themeFamily xmlns:thm15="http://schemas.microsoft.com/office/thememl/2012/main" name="Metropolitan" id="{4C5440D6-04D2-4954-96CF-F251137069B2}" vid="{79CFCA13-9412-4290-BB4B-85112F88857B}"/>
     </a:ext>
   </a:extLst>
 </a:theme>

</xml_diff>